<commit_message>
Update project05 - 파워포인트 종합 - 현태.pptx
</commit_message>
<xml_diff>
--- a/0 발표용 파워포인트/project05 - 파워포인트 종합 - 현태.pptx
+++ b/0 발표용 파워포인트/project05 - 파워포인트 종합 - 현태.pptx
@@ -5,10 +5,11 @@
     <p:sldMasterId id="2147483648" r:id="rId1"/>
   </p:sldMasterIdLst>
   <p:notesMasterIdLst>
-    <p:notesMasterId r:id="rId3"/>
+    <p:notesMasterId r:id="rId4"/>
   </p:notesMasterIdLst>
   <p:sldIdLst>
     <p:sldId id="256" r:id="rId2"/>
+    <p:sldId id="257" r:id="rId3"/>
   </p:sldIdLst>
   <p:sldSz cx="12192000" cy="6858000"/>
   <p:notesSz cx="6858000" cy="9144000"/>
@@ -109,7 +110,7 @@
   </p:defaultTextStyle>
   <p:extLst>
     <p:ext uri="{EFAFB233-063F-42B5-8137-9DF3F51BA10A}">
-      <p15:sldGuideLst xmlns:p15="http://schemas.microsoft.com/office/powerpoint/2012/main">
+      <p15:sldGuideLst xmlns:p15="http://schemas.microsoft.com/office/powerpoint/2012/main" xmlns="">
         <p15:guide id="1" orient="horz" pos="2160">
           <p15:clr>
             <a:srgbClr val="A4A3A4"/>
@@ -209,7 +210,7 @@
             <a:fld id="{EFE7F2A0-C7D9-4DBD-AE3B-C1A712DCE501}" type="datetimeFigureOut">
               <a:rPr lang="ko-KR" altLang="en-US" smtClean="0"/>
               <a:pPr/>
-              <a:t>2020-03-28</a:t>
+              <a:t>2020-03-30</a:t>
             </a:fld>
             <a:endParaRPr lang="ko-KR" altLang="en-US"/>
           </a:p>
@@ -478,6 +479,133 @@
 </p:notesMaster>
 </file>
 
+<file path=ppt/notesSlides/notesSlide1.xml><?xml version="1.0" encoding="utf-8"?>
+<p:notes xmlns:a="http://schemas.openxmlformats.org/drawingml/2006/main" xmlns:r="http://schemas.openxmlformats.org/officeDocument/2006/relationships" xmlns:p="http://schemas.openxmlformats.org/presentationml/2006/main" showMasterSp="0" showMasterPhAnim="0">
+  <p:cSld>
+    <p:spTree>
+      <p:nvGrpSpPr>
+        <p:cNvPr id="1" name="Shape 160"/>
+        <p:cNvGrpSpPr/>
+        <p:nvPr/>
+      </p:nvGrpSpPr>
+      <p:grpSpPr>
+        <a:xfrm>
+          <a:off x="0" y="0"/>
+          <a:ext cx="0" cy="0"/>
+          <a:chOff x="0" y="0"/>
+          <a:chExt cx="0" cy="0"/>
+        </a:xfrm>
+      </p:grpSpPr>
+      <p:sp>
+        <p:nvSpPr>
+          <p:cNvPr id="161" name="Google Shape;161;g7c553259d1_0_81:notes"/>
+          <p:cNvSpPr txBox="1">
+            <a:spLocks noGrp="1"/>
+          </p:cNvSpPr>
+          <p:nvPr>
+            <p:ph type="body" idx="1"/>
+          </p:nvPr>
+        </p:nvSpPr>
+        <p:spPr>
+          <a:xfrm>
+            <a:off x="685800" y="4343400"/>
+            <a:ext cx="5486400" cy="4114800"/>
+          </a:xfrm>
+          <a:prstGeom prst="rect">
+            <a:avLst/>
+          </a:prstGeom>
+          <a:noFill/>
+          <a:ln>
+            <a:noFill/>
+          </a:ln>
+        </p:spPr>
+        <p:txBody>
+          <a:bodyPr spcFirstLastPara="1" wrap="square" lIns="91425" tIns="91425" rIns="91425" bIns="91425" anchor="t" anchorCtr="0">
+            <a:noAutofit/>
+          </a:bodyPr>
+          <a:lstStyle/>
+          <a:p>
+            <a:pPr marL="0" lvl="0" indent="0" algn="l" rtl="0">
+              <a:lnSpc>
+                <a:spcPct val="100000"/>
+              </a:lnSpc>
+              <a:spcBef>
+                <a:spcPts val="0"/>
+              </a:spcBef>
+              <a:spcAft>
+                <a:spcPts val="0"/>
+              </a:spcAft>
+              <a:buSzPts val="1100"/>
+              <a:buNone/>
+            </a:pPr>
+            <a:endParaRPr/>
+          </a:p>
+        </p:txBody>
+      </p:sp>
+      <p:sp>
+        <p:nvSpPr>
+          <p:cNvPr id="162" name="Google Shape;162;g7c553259d1_0_81:notes"/>
+          <p:cNvSpPr>
+            <a:spLocks noGrp="1" noRot="1" noChangeAspect="1"/>
+          </p:cNvSpPr>
+          <p:nvPr>
+            <p:ph type="sldImg" idx="2"/>
+          </p:nvPr>
+        </p:nvSpPr>
+        <p:spPr>
+          <a:xfrm>
+            <a:off x="381000" y="685800"/>
+            <a:ext cx="6096000" cy="3429000"/>
+          </a:xfrm>
+          <a:custGeom>
+            <a:avLst/>
+            <a:gdLst/>
+            <a:ahLst/>
+            <a:cxnLst/>
+            <a:rect l="l" t="t" r="r" b="b"/>
+            <a:pathLst>
+              <a:path w="120000" h="120000" extrusionOk="0">
+                <a:moveTo>
+                  <a:pt x="0" y="0"/>
+                </a:moveTo>
+                <a:lnTo>
+                  <a:pt x="120000" y="0"/>
+                </a:lnTo>
+                <a:lnTo>
+                  <a:pt x="120000" y="120000"/>
+                </a:lnTo>
+                <a:lnTo>
+                  <a:pt x="0" y="120000"/>
+                </a:lnTo>
+                <a:close/>
+              </a:path>
+            </a:pathLst>
+          </a:custGeom>
+          <a:noFill/>
+          <a:ln w="9525" cap="flat" cmpd="sng">
+            <a:solidFill>
+              <a:srgbClr val="000000"/>
+            </a:solidFill>
+            <a:prstDash val="solid"/>
+            <a:round/>
+            <a:headEnd type="none" w="sm" len="sm"/>
+            <a:tailEnd type="none" w="sm" len="sm"/>
+          </a:ln>
+        </p:spPr>
+      </p:sp>
+    </p:spTree>
+    <p:extLst>
+      <p:ext uri="{BB962C8B-B14F-4D97-AF65-F5344CB8AC3E}">
+        <p14:creationId xmlns:p14="http://schemas.microsoft.com/office/powerpoint/2010/main" val="190116678"/>
+      </p:ext>
+    </p:extLst>
+  </p:cSld>
+  <p:clrMapOvr>
+    <a:masterClrMapping/>
+  </p:clrMapOvr>
+</p:notes>
+</file>
+
 <file path=ppt/slideLayouts/slideLayout1.xml><?xml version="1.0" encoding="utf-8"?>
 <p:sldLayout xmlns:a="http://schemas.openxmlformats.org/drawingml/2006/main" xmlns:r="http://schemas.openxmlformats.org/officeDocument/2006/relationships" xmlns:p="http://schemas.openxmlformats.org/presentationml/2006/main" type="title" preserve="1">
   <p:cSld name="제목 슬라이드">
@@ -610,7 +738,7 @@
             <a:fld id="{272C3D53-FEDF-49EC-8F65-FFFC138B637E}" type="datetimeFigureOut">
               <a:rPr lang="ko-KR" altLang="en-US" smtClean="0"/>
               <a:pPr/>
-              <a:t>2020-03-28</a:t>
+              <a:t>2020-03-30</a:t>
             </a:fld>
             <a:endParaRPr lang="ko-KR" altLang="en-US"/>
           </a:p>
@@ -782,7 +910,7 @@
             <a:fld id="{272C3D53-FEDF-49EC-8F65-FFFC138B637E}" type="datetimeFigureOut">
               <a:rPr lang="ko-KR" altLang="en-US" smtClean="0"/>
               <a:pPr/>
-              <a:t>2020-03-28</a:t>
+              <a:t>2020-03-30</a:t>
             </a:fld>
             <a:endParaRPr lang="ko-KR" altLang="en-US"/>
           </a:p>
@@ -964,7 +1092,7 @@
             <a:fld id="{272C3D53-FEDF-49EC-8F65-FFFC138B637E}" type="datetimeFigureOut">
               <a:rPr lang="ko-KR" altLang="en-US" smtClean="0"/>
               <a:pPr/>
-              <a:t>2020-03-28</a:t>
+              <a:t>2020-03-30</a:t>
             </a:fld>
             <a:endParaRPr lang="ko-KR" altLang="en-US"/>
           </a:p>
@@ -1136,7 +1264,7 @@
             <a:fld id="{272C3D53-FEDF-49EC-8F65-FFFC138B637E}" type="datetimeFigureOut">
               <a:rPr lang="ko-KR" altLang="en-US" smtClean="0"/>
               <a:pPr/>
-              <a:t>2020-03-28</a:t>
+              <a:t>2020-03-30</a:t>
             </a:fld>
             <a:endParaRPr lang="ko-KR" altLang="en-US"/>
           </a:p>
@@ -1384,7 +1512,7 @@
             <a:fld id="{272C3D53-FEDF-49EC-8F65-FFFC138B637E}" type="datetimeFigureOut">
               <a:rPr lang="ko-KR" altLang="en-US" smtClean="0"/>
               <a:pPr/>
-              <a:t>2020-03-28</a:t>
+              <a:t>2020-03-30</a:t>
             </a:fld>
             <a:endParaRPr lang="ko-KR" altLang="en-US"/>
           </a:p>
@@ -1618,7 +1746,7 @@
             <a:fld id="{272C3D53-FEDF-49EC-8F65-FFFC138B637E}" type="datetimeFigureOut">
               <a:rPr lang="ko-KR" altLang="en-US" smtClean="0"/>
               <a:pPr/>
-              <a:t>2020-03-28</a:t>
+              <a:t>2020-03-30</a:t>
             </a:fld>
             <a:endParaRPr lang="ko-KR" altLang="en-US"/>
           </a:p>
@@ -1987,7 +2115,7 @@
             <a:fld id="{272C3D53-FEDF-49EC-8F65-FFFC138B637E}" type="datetimeFigureOut">
               <a:rPr lang="ko-KR" altLang="en-US" smtClean="0"/>
               <a:pPr/>
-              <a:t>2020-03-28</a:t>
+              <a:t>2020-03-30</a:t>
             </a:fld>
             <a:endParaRPr lang="ko-KR" altLang="en-US"/>
           </a:p>
@@ -2107,7 +2235,7 @@
             <a:fld id="{272C3D53-FEDF-49EC-8F65-FFFC138B637E}" type="datetimeFigureOut">
               <a:rPr lang="ko-KR" altLang="en-US" smtClean="0"/>
               <a:pPr/>
-              <a:t>2020-03-28</a:t>
+              <a:t>2020-03-30</a:t>
             </a:fld>
             <a:endParaRPr lang="ko-KR" altLang="en-US"/>
           </a:p>
@@ -2204,7 +2332,7 @@
             <a:fld id="{272C3D53-FEDF-49EC-8F65-FFFC138B637E}" type="datetimeFigureOut">
               <a:rPr lang="ko-KR" altLang="en-US" smtClean="0"/>
               <a:pPr/>
-              <a:t>2020-03-28</a:t>
+              <a:t>2020-03-30</a:t>
             </a:fld>
             <a:endParaRPr lang="ko-KR" altLang="en-US"/>
           </a:p>
@@ -2483,7 +2611,7 @@
             <a:fld id="{272C3D53-FEDF-49EC-8F65-FFFC138B637E}" type="datetimeFigureOut">
               <a:rPr lang="ko-KR" altLang="en-US" smtClean="0"/>
               <a:pPr/>
-              <a:t>2020-03-28</a:t>
+              <a:t>2020-03-30</a:t>
             </a:fld>
             <a:endParaRPr lang="ko-KR" altLang="en-US"/>
           </a:p>
@@ -2738,7 +2866,7 @@
             <a:fld id="{272C3D53-FEDF-49EC-8F65-FFFC138B637E}" type="datetimeFigureOut">
               <a:rPr lang="ko-KR" altLang="en-US" smtClean="0"/>
               <a:pPr/>
-              <a:t>2020-03-28</a:t>
+              <a:t>2020-03-30</a:t>
             </a:fld>
             <a:endParaRPr lang="ko-KR" altLang="en-US"/>
           </a:p>
@@ -2953,7 +3081,7 @@
             <a:fld id="{272C3D53-FEDF-49EC-8F65-FFFC138B637E}" type="datetimeFigureOut">
               <a:rPr lang="ko-KR" altLang="en-US" smtClean="0"/>
               <a:pPr/>
-              <a:t>2020-03-28</a:t>
+              <a:t>2020-03-30</a:t>
             </a:fld>
             <a:endParaRPr lang="ko-KR" altLang="en-US"/>
           </a:p>
@@ -3411,7 +3539,6 @@
               <a:rPr lang="en-US" altLang="ko-KR" dirty="0" smtClean="0"/>
               <a:t>5</a:t>
             </a:r>
-            <a:endParaRPr lang="en-US" altLang="ko-KR" dirty="0" smtClean="0"/>
           </a:p>
           <a:p>
             <a:r>
@@ -3443,6 +3570,2156 @@
   <p:clrMapOvr>
     <a:masterClrMapping/>
   </p:clrMapOvr>
+</p:sld>
+</file>
+
+<file path=ppt/slides/slide2.xml><?xml version="1.0" encoding="utf-8"?>
+<p:sld xmlns:a="http://schemas.openxmlformats.org/drawingml/2006/main" xmlns:r="http://schemas.openxmlformats.org/officeDocument/2006/relationships" xmlns:p="http://schemas.openxmlformats.org/presentationml/2006/main">
+  <p:cSld>
+    <p:spTree>
+      <p:nvGrpSpPr>
+        <p:cNvPr id="1" name="Shape 163"/>
+        <p:cNvGrpSpPr/>
+        <p:nvPr/>
+      </p:nvGrpSpPr>
+      <p:grpSpPr>
+        <a:xfrm>
+          <a:off x="0" y="0"/>
+          <a:ext cx="0" cy="0"/>
+          <a:chOff x="0" y="0"/>
+          <a:chExt cx="0" cy="0"/>
+        </a:xfrm>
+      </p:grpSpPr>
+      <p:graphicFrame>
+        <p:nvGraphicFramePr>
+          <p:cNvPr id="165" name="Google Shape;165;g7c553259d1_0_81"/>
+          <p:cNvGraphicFramePr/>
+          <p:nvPr>
+            <p:extLst>
+              <p:ext uri="{D42A27DB-BD31-4B8C-83A1-F6EECF244321}">
+                <p14:modId xmlns:p14="http://schemas.microsoft.com/office/powerpoint/2010/main" val="3780487597"/>
+              </p:ext>
+            </p:extLst>
+          </p:nvPr>
+        </p:nvGraphicFramePr>
+        <p:xfrm>
+          <a:off x="131601" y="115759"/>
+          <a:ext cx="4124100" cy="960150"/>
+        </p:xfrm>
+        <a:graphic>
+          <a:graphicData uri="http://schemas.openxmlformats.org/drawingml/2006/table">
+            <a:tbl>
+              <a:tblPr firstRow="1" bandRow="1">
+                <a:noFill/>
+              </a:tblPr>
+              <a:tblGrid>
+                <a:gridCol w="1443550">
+                  <a:extLst>
+                    <a:ext uri="{9D8B030D-6E8A-4147-A177-3AD203B41FA5}">
+                      <a16:colId xmlns:a16="http://schemas.microsoft.com/office/drawing/2014/main" xmlns="" val="20000"/>
+                    </a:ext>
+                  </a:extLst>
+                </a:gridCol>
+                <a:gridCol w="2680550">
+                  <a:extLst>
+                    <a:ext uri="{9D8B030D-6E8A-4147-A177-3AD203B41FA5}">
+                      <a16:colId xmlns:a16="http://schemas.microsoft.com/office/drawing/2014/main" xmlns="" val="20001"/>
+                    </a:ext>
+                  </a:extLst>
+                </a:gridCol>
+              </a:tblGrid>
+              <a:tr h="271225">
+                <a:tc>
+                  <a:txBody>
+                    <a:bodyPr/>
+                    <a:lstStyle/>
+                    <a:p>
+                      <a:pPr marL="0" marR="0" lvl="0" indent="0" algn="ctr" rtl="0">
+                        <a:lnSpc>
+                          <a:spcPct val="100000"/>
+                        </a:lnSpc>
+                        <a:spcBef>
+                          <a:spcPts val="0"/>
+                        </a:spcBef>
+                        <a:spcAft>
+                          <a:spcPts val="0"/>
+                        </a:spcAft>
+                        <a:buClr>
+                          <a:srgbClr val="000000"/>
+                        </a:buClr>
+                        <a:buSzPts val="1500"/>
+                        <a:buFont typeface="Arial"/>
+                        <a:buNone/>
+                      </a:pPr>
+                      <a:r>
+                        <a:rPr lang="ko-KR" sz="1500" b="0" u="none" strike="noStrike" cap="none" dirty="0">
+                          <a:solidFill>
+                            <a:schemeClr val="dk1"/>
+                          </a:solidFill>
+                        </a:rPr>
+                        <a:t>화면코드</a:t>
+                      </a:r>
+                      <a:endParaRPr sz="1500" b="0" u="none" strike="noStrike" cap="none" dirty="0">
+                        <a:solidFill>
+                          <a:schemeClr val="dk1"/>
+                        </a:solidFill>
+                      </a:endParaRPr>
+                    </a:p>
+                  </a:txBody>
+                  <a:tcPr marL="91450" marR="91450" marT="45725" marB="45725" anchor="ctr">
+                    <a:lnL w="12700" cap="flat" cmpd="sng">
+                      <a:solidFill>
+                        <a:schemeClr val="dk1"/>
+                      </a:solidFill>
+                      <a:prstDash val="solid"/>
+                      <a:round/>
+                      <a:headEnd type="none" w="sm" len="sm"/>
+                      <a:tailEnd type="none" w="sm" len="sm"/>
+                    </a:lnL>
+                    <a:lnR w="12700" cap="flat" cmpd="sng">
+                      <a:solidFill>
+                        <a:schemeClr val="dk1"/>
+                      </a:solidFill>
+                      <a:prstDash val="solid"/>
+                      <a:round/>
+                      <a:headEnd type="none" w="sm" len="sm"/>
+                      <a:tailEnd type="none" w="sm" len="sm"/>
+                    </a:lnR>
+                    <a:lnT w="12700" cap="flat" cmpd="sng">
+                      <a:solidFill>
+                        <a:schemeClr val="dk1"/>
+                      </a:solidFill>
+                      <a:prstDash val="solid"/>
+                      <a:round/>
+                      <a:headEnd type="none" w="sm" len="sm"/>
+                      <a:tailEnd type="none" w="sm" len="sm"/>
+                    </a:lnT>
+                    <a:lnB w="12700" cap="flat" cmpd="sng">
+                      <a:solidFill>
+                        <a:schemeClr val="dk1"/>
+                      </a:solidFill>
+                      <a:prstDash val="solid"/>
+                      <a:round/>
+                      <a:headEnd type="none" w="sm" len="sm"/>
+                      <a:tailEnd type="none" w="sm" len="sm"/>
+                    </a:lnB>
+                    <a:solidFill>
+                      <a:srgbClr val="D8D8D8"/>
+                    </a:solidFill>
+                  </a:tcPr>
+                </a:tc>
+                <a:tc>
+                  <a:txBody>
+                    <a:bodyPr/>
+                    <a:lstStyle/>
+                    <a:p>
+                      <a:pPr marL="0" marR="0" lvl="0" indent="0" algn="ctr" rtl="0">
+                        <a:lnSpc>
+                          <a:spcPct val="100000"/>
+                        </a:lnSpc>
+                        <a:spcBef>
+                          <a:spcPts val="0"/>
+                        </a:spcBef>
+                        <a:spcAft>
+                          <a:spcPts val="0"/>
+                        </a:spcAft>
+                        <a:buClr>
+                          <a:srgbClr val="000000"/>
+                        </a:buClr>
+                        <a:buSzPts val="1500"/>
+                        <a:buFont typeface="Arial"/>
+                        <a:buNone/>
+                      </a:pPr>
+                      <a:endParaRPr lang="en-US" altLang="ko-KR" sz="1500" b="0" u="none" strike="noStrike" cap="none" dirty="0">
+                        <a:solidFill>
+                          <a:schemeClr val="dk1"/>
+                        </a:solidFill>
+                      </a:endParaRPr>
+                    </a:p>
+                  </a:txBody>
+                  <a:tcPr marL="91450" marR="91450" marT="45725" marB="45725" anchor="ctr">
+                    <a:lnL w="12700" cap="flat" cmpd="sng">
+                      <a:solidFill>
+                        <a:schemeClr val="dk1"/>
+                      </a:solidFill>
+                      <a:prstDash val="solid"/>
+                      <a:round/>
+                      <a:headEnd type="none" w="sm" len="sm"/>
+                      <a:tailEnd type="none" w="sm" len="sm"/>
+                    </a:lnL>
+                    <a:lnR w="12700" cap="flat" cmpd="sng">
+                      <a:solidFill>
+                        <a:schemeClr val="dk1"/>
+                      </a:solidFill>
+                      <a:prstDash val="solid"/>
+                      <a:round/>
+                      <a:headEnd type="none" w="sm" len="sm"/>
+                      <a:tailEnd type="none" w="sm" len="sm"/>
+                    </a:lnR>
+                    <a:lnT w="12700" cap="flat" cmpd="sng">
+                      <a:solidFill>
+                        <a:schemeClr val="dk1"/>
+                      </a:solidFill>
+                      <a:prstDash val="solid"/>
+                      <a:round/>
+                      <a:headEnd type="none" w="sm" len="sm"/>
+                      <a:tailEnd type="none" w="sm" len="sm"/>
+                    </a:lnT>
+                    <a:lnB w="12700" cap="flat" cmpd="sng">
+                      <a:solidFill>
+                        <a:schemeClr val="dk1"/>
+                      </a:solidFill>
+                      <a:prstDash val="solid"/>
+                      <a:round/>
+                      <a:headEnd type="none" w="sm" len="sm"/>
+                      <a:tailEnd type="none" w="sm" len="sm"/>
+                    </a:lnB>
+                    <a:solidFill>
+                      <a:schemeClr val="lt1"/>
+                    </a:solidFill>
+                  </a:tcPr>
+                </a:tc>
+                <a:extLst>
+                  <a:ext uri="{0D108BD9-81ED-4DB2-BD59-A6C34878D82A}">
+                    <a16:rowId xmlns:a16="http://schemas.microsoft.com/office/drawing/2014/main" xmlns="" val="10000"/>
+                  </a:ext>
+                </a:extLst>
+              </a:tr>
+              <a:tr h="271225">
+                <a:tc rowSpan="2">
+                  <a:txBody>
+                    <a:bodyPr/>
+                    <a:lstStyle/>
+                    <a:p>
+                      <a:pPr marL="0" marR="0" lvl="0" indent="0" algn="ctr" rtl="0">
+                        <a:lnSpc>
+                          <a:spcPct val="100000"/>
+                        </a:lnSpc>
+                        <a:spcBef>
+                          <a:spcPts val="0"/>
+                        </a:spcBef>
+                        <a:spcAft>
+                          <a:spcPts val="0"/>
+                        </a:spcAft>
+                        <a:buClr>
+                          <a:srgbClr val="000000"/>
+                        </a:buClr>
+                        <a:buSzPts val="1500"/>
+                        <a:buFont typeface="Arial"/>
+                        <a:buNone/>
+                      </a:pPr>
+                      <a:r>
+                        <a:rPr lang="ko-KR" sz="1500" b="0" u="none" strike="noStrike" cap="none" dirty="0" err="1">
+                          <a:solidFill>
+                            <a:schemeClr val="dk1"/>
+                          </a:solidFill>
+                        </a:rPr>
+                        <a:t>화면명</a:t>
+                      </a:r>
+                      <a:endParaRPr sz="1500" b="0" u="none" strike="noStrike" cap="none" dirty="0" err="1">
+                        <a:solidFill>
+                          <a:schemeClr val="dk1"/>
+                        </a:solidFill>
+                      </a:endParaRPr>
+                    </a:p>
+                  </a:txBody>
+                  <a:tcPr marL="91450" marR="91450" marT="45725" marB="45725" anchor="ctr">
+                    <a:lnL w="12700" cap="flat" cmpd="sng">
+                      <a:solidFill>
+                        <a:schemeClr val="dk1"/>
+                      </a:solidFill>
+                      <a:prstDash val="solid"/>
+                      <a:round/>
+                      <a:headEnd type="none" w="sm" len="sm"/>
+                      <a:tailEnd type="none" w="sm" len="sm"/>
+                    </a:lnL>
+                    <a:lnR w="12700" cap="flat" cmpd="sng">
+                      <a:solidFill>
+                        <a:schemeClr val="dk1"/>
+                      </a:solidFill>
+                      <a:prstDash val="solid"/>
+                      <a:round/>
+                      <a:headEnd type="none" w="sm" len="sm"/>
+                      <a:tailEnd type="none" w="sm" len="sm"/>
+                    </a:lnR>
+                    <a:lnT w="12700" cap="flat" cmpd="sng">
+                      <a:solidFill>
+                        <a:schemeClr val="dk1"/>
+                      </a:solidFill>
+                      <a:prstDash val="solid"/>
+                      <a:round/>
+                      <a:headEnd type="none" w="sm" len="sm"/>
+                      <a:tailEnd type="none" w="sm" len="sm"/>
+                    </a:lnT>
+                    <a:lnB w="12700" cap="flat" cmpd="sng">
+                      <a:solidFill>
+                        <a:schemeClr val="dk1"/>
+                      </a:solidFill>
+                      <a:prstDash val="solid"/>
+                      <a:round/>
+                      <a:headEnd type="none" w="sm" len="sm"/>
+                      <a:tailEnd type="none" w="sm" len="sm"/>
+                    </a:lnB>
+                    <a:solidFill>
+                      <a:srgbClr val="D8D8D8"/>
+                    </a:solidFill>
+                  </a:tcPr>
+                </a:tc>
+                <a:tc>
+                  <a:txBody>
+                    <a:bodyPr/>
+                    <a:lstStyle/>
+                    <a:p>
+                      <a:pPr marL="0" marR="0" lvl="0" indent="0" algn="ctr">
+                        <a:lnSpc>
+                          <a:spcPct val="100000"/>
+                        </a:lnSpc>
+                        <a:spcBef>
+                          <a:spcPts val="0"/>
+                        </a:spcBef>
+                        <a:spcAft>
+                          <a:spcPts val="0"/>
+                        </a:spcAft>
+                        <a:buNone/>
+                      </a:pPr>
+                      <a:endParaRPr sz="1500" b="0" u="none" strike="noStrike" cap="none" dirty="0">
+                        <a:solidFill>
+                          <a:schemeClr val="dk1"/>
+                        </a:solidFill>
+                      </a:endParaRPr>
+                    </a:p>
+                  </a:txBody>
+                  <a:tcPr marL="91450" marR="91450" marT="45725" marB="45725" anchor="ctr">
+                    <a:lnL w="12700" cap="flat" cmpd="sng">
+                      <a:solidFill>
+                        <a:schemeClr val="dk1"/>
+                      </a:solidFill>
+                      <a:prstDash val="solid"/>
+                      <a:round/>
+                      <a:headEnd type="none" w="sm" len="sm"/>
+                      <a:tailEnd type="none" w="sm" len="sm"/>
+                    </a:lnL>
+                    <a:lnR w="12700" cap="flat" cmpd="sng">
+                      <a:solidFill>
+                        <a:schemeClr val="dk1"/>
+                      </a:solidFill>
+                      <a:prstDash val="solid"/>
+                      <a:round/>
+                      <a:headEnd type="none" w="sm" len="sm"/>
+                      <a:tailEnd type="none" w="sm" len="sm"/>
+                    </a:lnR>
+                    <a:lnT w="12700" cap="flat" cmpd="sng">
+                      <a:solidFill>
+                        <a:schemeClr val="dk1"/>
+                      </a:solidFill>
+                      <a:prstDash val="solid"/>
+                      <a:round/>
+                      <a:headEnd type="none" w="sm" len="sm"/>
+                      <a:tailEnd type="none" w="sm" len="sm"/>
+                    </a:lnT>
+                    <a:lnB w="12700" cap="flat" cmpd="sng">
+                      <a:solidFill>
+                        <a:schemeClr val="dk1"/>
+                      </a:solidFill>
+                      <a:prstDash val="solid"/>
+                      <a:round/>
+                      <a:headEnd type="none" w="sm" len="sm"/>
+                      <a:tailEnd type="none" w="sm" len="sm"/>
+                    </a:lnB>
+                    <a:solidFill>
+                      <a:schemeClr val="lt1"/>
+                    </a:solidFill>
+                  </a:tcPr>
+                </a:tc>
+                <a:extLst>
+                  <a:ext uri="{0D108BD9-81ED-4DB2-BD59-A6C34878D82A}">
+                    <a16:rowId xmlns:a16="http://schemas.microsoft.com/office/drawing/2014/main" xmlns="" val="10001"/>
+                  </a:ext>
+                </a:extLst>
+              </a:tr>
+              <a:tr h="271225">
+                <a:tc vMerge="1">
+                  <a:txBody>
+                    <a:bodyPr/>
+                    <a:lstStyle/>
+                    <a:p>
+                      <a:endParaRPr lang="ko-KR"/>
+                    </a:p>
+                  </a:txBody>
+                  <a:tcPr/>
+                </a:tc>
+                <a:tc>
+                  <a:txBody>
+                    <a:bodyPr/>
+                    <a:lstStyle/>
+                    <a:p>
+                      <a:pPr marL="0" marR="0" lvl="0" indent="0" algn="ctr" rtl="0">
+                        <a:lnSpc>
+                          <a:spcPct val="100000"/>
+                        </a:lnSpc>
+                        <a:spcBef>
+                          <a:spcPts val="0"/>
+                        </a:spcBef>
+                        <a:spcAft>
+                          <a:spcPts val="0"/>
+                        </a:spcAft>
+                        <a:buClr>
+                          <a:srgbClr val="000000"/>
+                        </a:buClr>
+                        <a:buSzPts val="1500"/>
+                        <a:buFont typeface="Arial"/>
+                        <a:buNone/>
+                      </a:pPr>
+                      <a:endParaRPr sz="1500" b="0" u="none" strike="noStrike" cap="none" dirty="0">
+                        <a:solidFill>
+                          <a:schemeClr val="dk1"/>
+                        </a:solidFill>
+                      </a:endParaRPr>
+                    </a:p>
+                  </a:txBody>
+                  <a:tcPr marL="91450" marR="91450" marT="45725" marB="45725" anchor="ctr">
+                    <a:lnL w="12700" cap="flat" cmpd="sng">
+                      <a:solidFill>
+                        <a:schemeClr val="dk1"/>
+                      </a:solidFill>
+                      <a:prstDash val="solid"/>
+                      <a:round/>
+                      <a:headEnd type="none" w="sm" len="sm"/>
+                      <a:tailEnd type="none" w="sm" len="sm"/>
+                    </a:lnL>
+                    <a:lnR w="12700" cap="flat" cmpd="sng">
+                      <a:solidFill>
+                        <a:schemeClr val="dk1"/>
+                      </a:solidFill>
+                      <a:prstDash val="solid"/>
+                      <a:round/>
+                      <a:headEnd type="none" w="sm" len="sm"/>
+                      <a:tailEnd type="none" w="sm" len="sm"/>
+                    </a:lnR>
+                    <a:lnT w="12700" cap="flat" cmpd="sng">
+                      <a:solidFill>
+                        <a:schemeClr val="dk1"/>
+                      </a:solidFill>
+                      <a:prstDash val="solid"/>
+                      <a:round/>
+                      <a:headEnd type="none" w="sm" len="sm"/>
+                      <a:tailEnd type="none" w="sm" len="sm"/>
+                    </a:lnT>
+                    <a:lnB w="12700" cap="flat" cmpd="sng">
+                      <a:solidFill>
+                        <a:schemeClr val="dk1"/>
+                      </a:solidFill>
+                      <a:prstDash val="solid"/>
+                      <a:round/>
+                      <a:headEnd type="none" w="sm" len="sm"/>
+                      <a:tailEnd type="none" w="sm" len="sm"/>
+                    </a:lnB>
+                    <a:solidFill>
+                      <a:schemeClr val="lt1"/>
+                    </a:solidFill>
+                  </a:tcPr>
+                </a:tc>
+                <a:extLst>
+                  <a:ext uri="{0D108BD9-81ED-4DB2-BD59-A6C34878D82A}">
+                    <a16:rowId xmlns:a16="http://schemas.microsoft.com/office/drawing/2014/main" xmlns="" val="10002"/>
+                  </a:ext>
+                </a:extLst>
+              </a:tr>
+            </a:tbl>
+          </a:graphicData>
+        </a:graphic>
+      </p:graphicFrame>
+      <p:graphicFrame>
+        <p:nvGraphicFramePr>
+          <p:cNvPr id="166" name="Google Shape;166;g7c553259d1_0_81"/>
+          <p:cNvGraphicFramePr/>
+          <p:nvPr/>
+        </p:nvGraphicFramePr>
+        <p:xfrm>
+          <a:off x="9309046" y="197403"/>
+          <a:ext cx="2815500" cy="320050"/>
+        </p:xfrm>
+        <a:graphic>
+          <a:graphicData uri="http://schemas.openxmlformats.org/drawingml/2006/table">
+            <a:tbl>
+              <a:tblPr firstRow="1" bandRow="1">
+                <a:noFill/>
+              </a:tblPr>
+              <a:tblGrid>
+                <a:gridCol w="1407750">
+                  <a:extLst>
+                    <a:ext uri="{9D8B030D-6E8A-4147-A177-3AD203B41FA5}">
+                      <a16:colId xmlns:a16="http://schemas.microsoft.com/office/drawing/2014/main" xmlns="" val="20000"/>
+                    </a:ext>
+                  </a:extLst>
+                </a:gridCol>
+                <a:gridCol w="1407750">
+                  <a:extLst>
+                    <a:ext uri="{9D8B030D-6E8A-4147-A177-3AD203B41FA5}">
+                      <a16:colId xmlns:a16="http://schemas.microsoft.com/office/drawing/2014/main" xmlns="" val="20001"/>
+                    </a:ext>
+                  </a:extLst>
+                </a:gridCol>
+              </a:tblGrid>
+              <a:tr h="265075">
+                <a:tc>
+                  <a:txBody>
+                    <a:bodyPr/>
+                    <a:lstStyle/>
+                    <a:p>
+                      <a:pPr marL="0" marR="0" lvl="0" indent="0" algn="ctr" rtl="0">
+                        <a:lnSpc>
+                          <a:spcPct val="100000"/>
+                        </a:lnSpc>
+                        <a:spcBef>
+                          <a:spcPts val="0"/>
+                        </a:spcBef>
+                        <a:spcAft>
+                          <a:spcPts val="0"/>
+                        </a:spcAft>
+                        <a:buClr>
+                          <a:srgbClr val="000000"/>
+                        </a:buClr>
+                        <a:buSzPts val="1500"/>
+                        <a:buFont typeface="Arial"/>
+                        <a:buNone/>
+                      </a:pPr>
+                      <a:r>
+                        <a:rPr lang="ko-KR" sz="1500" b="0" u="none" strike="noStrike" cap="none">
+                          <a:solidFill>
+                            <a:schemeClr val="dk1"/>
+                          </a:solidFill>
+                        </a:rPr>
+                        <a:t>화면 번호</a:t>
+                      </a:r>
+                      <a:endParaRPr sz="1500" b="0" u="none" strike="noStrike" cap="none">
+                        <a:solidFill>
+                          <a:schemeClr val="dk1"/>
+                        </a:solidFill>
+                      </a:endParaRPr>
+                    </a:p>
+                  </a:txBody>
+                  <a:tcPr marL="91450" marR="91450" marT="45725" marB="45725" anchor="ctr">
+                    <a:lnL w="12700" cap="flat" cmpd="sng">
+                      <a:solidFill>
+                        <a:schemeClr val="dk1"/>
+                      </a:solidFill>
+                      <a:prstDash val="solid"/>
+                      <a:round/>
+                      <a:headEnd type="none" w="sm" len="sm"/>
+                      <a:tailEnd type="none" w="sm" len="sm"/>
+                    </a:lnL>
+                    <a:lnR w="12700" cap="flat" cmpd="sng">
+                      <a:solidFill>
+                        <a:schemeClr val="dk1"/>
+                      </a:solidFill>
+                      <a:prstDash val="solid"/>
+                      <a:round/>
+                      <a:headEnd type="none" w="sm" len="sm"/>
+                      <a:tailEnd type="none" w="sm" len="sm"/>
+                    </a:lnR>
+                    <a:lnT w="12700" cap="flat" cmpd="sng">
+                      <a:solidFill>
+                        <a:schemeClr val="dk1"/>
+                      </a:solidFill>
+                      <a:prstDash val="solid"/>
+                      <a:round/>
+                      <a:headEnd type="none" w="sm" len="sm"/>
+                      <a:tailEnd type="none" w="sm" len="sm"/>
+                    </a:lnT>
+                    <a:lnB w="12700" cap="flat" cmpd="sng">
+                      <a:solidFill>
+                        <a:schemeClr val="dk1"/>
+                      </a:solidFill>
+                      <a:prstDash val="solid"/>
+                      <a:round/>
+                      <a:headEnd type="none" w="sm" len="sm"/>
+                      <a:tailEnd type="none" w="sm" len="sm"/>
+                    </a:lnB>
+                    <a:solidFill>
+                      <a:srgbClr val="D8D8D8"/>
+                    </a:solidFill>
+                  </a:tcPr>
+                </a:tc>
+                <a:tc>
+                  <a:txBody>
+                    <a:bodyPr/>
+                    <a:lstStyle/>
+                    <a:p>
+                      <a:pPr marL="0" marR="0" lvl="0" indent="0" algn="ctr" rtl="0">
+                        <a:lnSpc>
+                          <a:spcPct val="100000"/>
+                        </a:lnSpc>
+                        <a:spcBef>
+                          <a:spcPts val="0"/>
+                        </a:spcBef>
+                        <a:spcAft>
+                          <a:spcPts val="0"/>
+                        </a:spcAft>
+                        <a:buClr>
+                          <a:srgbClr val="000000"/>
+                        </a:buClr>
+                        <a:buSzPts val="1500"/>
+                        <a:buFont typeface="Arial"/>
+                        <a:buNone/>
+                      </a:pPr>
+                      <a:endParaRPr sz="1500" b="0" u="none" strike="noStrike" cap="none">
+                        <a:solidFill>
+                          <a:schemeClr val="dk1"/>
+                        </a:solidFill>
+                      </a:endParaRPr>
+                    </a:p>
+                  </a:txBody>
+                  <a:tcPr marL="91450" marR="91450" marT="45725" marB="45725" anchor="ctr">
+                    <a:lnL w="12700" cap="flat" cmpd="sng">
+                      <a:solidFill>
+                        <a:schemeClr val="dk1"/>
+                      </a:solidFill>
+                      <a:prstDash val="solid"/>
+                      <a:round/>
+                      <a:headEnd type="none" w="sm" len="sm"/>
+                      <a:tailEnd type="none" w="sm" len="sm"/>
+                    </a:lnL>
+                    <a:lnR w="12700" cap="flat" cmpd="sng">
+                      <a:solidFill>
+                        <a:schemeClr val="dk1"/>
+                      </a:solidFill>
+                      <a:prstDash val="solid"/>
+                      <a:round/>
+                      <a:headEnd type="none" w="sm" len="sm"/>
+                      <a:tailEnd type="none" w="sm" len="sm"/>
+                    </a:lnR>
+                    <a:lnT w="12700" cap="flat" cmpd="sng">
+                      <a:solidFill>
+                        <a:schemeClr val="dk1"/>
+                      </a:solidFill>
+                      <a:prstDash val="solid"/>
+                      <a:round/>
+                      <a:headEnd type="none" w="sm" len="sm"/>
+                      <a:tailEnd type="none" w="sm" len="sm"/>
+                    </a:lnT>
+                    <a:lnB w="12700" cap="flat" cmpd="sng">
+                      <a:solidFill>
+                        <a:schemeClr val="dk1"/>
+                      </a:solidFill>
+                      <a:prstDash val="solid"/>
+                      <a:round/>
+                      <a:headEnd type="none" w="sm" len="sm"/>
+                      <a:tailEnd type="none" w="sm" len="sm"/>
+                    </a:lnB>
+                    <a:solidFill>
+                      <a:schemeClr val="lt1"/>
+                    </a:solidFill>
+                  </a:tcPr>
+                </a:tc>
+                <a:extLst>
+                  <a:ext uri="{0D108BD9-81ED-4DB2-BD59-A6C34878D82A}">
+                    <a16:rowId xmlns:a16="http://schemas.microsoft.com/office/drawing/2014/main" xmlns="" val="10000"/>
+                  </a:ext>
+                </a:extLst>
+              </a:tr>
+            </a:tbl>
+          </a:graphicData>
+        </a:graphic>
+      </p:graphicFrame>
+      <p:graphicFrame>
+        <p:nvGraphicFramePr>
+          <p:cNvPr id="167" name="Google Shape;167;g7c553259d1_0_81"/>
+          <p:cNvGraphicFramePr/>
+          <p:nvPr/>
+        </p:nvGraphicFramePr>
+        <p:xfrm>
+          <a:off x="6200086" y="197403"/>
+          <a:ext cx="2815500" cy="320050"/>
+        </p:xfrm>
+        <a:graphic>
+          <a:graphicData uri="http://schemas.openxmlformats.org/drawingml/2006/table">
+            <a:tbl>
+              <a:tblPr firstRow="1" bandRow="1">
+                <a:noFill/>
+              </a:tblPr>
+              <a:tblGrid>
+                <a:gridCol w="1407750">
+                  <a:extLst>
+                    <a:ext uri="{9D8B030D-6E8A-4147-A177-3AD203B41FA5}">
+                      <a16:colId xmlns:a16="http://schemas.microsoft.com/office/drawing/2014/main" xmlns="" val="20000"/>
+                    </a:ext>
+                  </a:extLst>
+                </a:gridCol>
+                <a:gridCol w="1407750">
+                  <a:extLst>
+                    <a:ext uri="{9D8B030D-6E8A-4147-A177-3AD203B41FA5}">
+                      <a16:colId xmlns:a16="http://schemas.microsoft.com/office/drawing/2014/main" xmlns="" val="20001"/>
+                    </a:ext>
+                  </a:extLst>
+                </a:gridCol>
+              </a:tblGrid>
+              <a:tr h="265075">
+                <a:tc>
+                  <a:txBody>
+                    <a:bodyPr/>
+                    <a:lstStyle/>
+                    <a:p>
+                      <a:pPr marL="0" marR="0" lvl="0" indent="0" algn="ctr" rtl="0">
+                        <a:lnSpc>
+                          <a:spcPct val="100000"/>
+                        </a:lnSpc>
+                        <a:spcBef>
+                          <a:spcPts val="0"/>
+                        </a:spcBef>
+                        <a:spcAft>
+                          <a:spcPts val="0"/>
+                        </a:spcAft>
+                        <a:buClr>
+                          <a:srgbClr val="000000"/>
+                        </a:buClr>
+                        <a:buSzPts val="1500"/>
+                        <a:buFont typeface="Arial"/>
+                        <a:buNone/>
+                      </a:pPr>
+                      <a:r>
+                        <a:rPr lang="ko-KR" sz="1500" b="0" u="none" strike="noStrike" cap="none">
+                          <a:solidFill>
+                            <a:schemeClr val="dk1"/>
+                          </a:solidFill>
+                        </a:rPr>
+                        <a:t>프로젝트</a:t>
+                      </a:r>
+                      <a:endParaRPr sz="1500" b="0" u="none" strike="noStrike" cap="none">
+                        <a:solidFill>
+                          <a:schemeClr val="dk1"/>
+                        </a:solidFill>
+                      </a:endParaRPr>
+                    </a:p>
+                  </a:txBody>
+                  <a:tcPr marL="91450" marR="91450" marT="45725" marB="45725" anchor="ctr">
+                    <a:lnL w="12700" cap="flat" cmpd="sng">
+                      <a:solidFill>
+                        <a:schemeClr val="dk1"/>
+                      </a:solidFill>
+                      <a:prstDash val="solid"/>
+                      <a:round/>
+                      <a:headEnd type="none" w="sm" len="sm"/>
+                      <a:tailEnd type="none" w="sm" len="sm"/>
+                    </a:lnL>
+                    <a:lnR w="12700" cap="flat" cmpd="sng">
+                      <a:solidFill>
+                        <a:schemeClr val="dk1"/>
+                      </a:solidFill>
+                      <a:prstDash val="solid"/>
+                      <a:round/>
+                      <a:headEnd type="none" w="sm" len="sm"/>
+                      <a:tailEnd type="none" w="sm" len="sm"/>
+                    </a:lnR>
+                    <a:lnT w="12700" cap="flat" cmpd="sng">
+                      <a:solidFill>
+                        <a:schemeClr val="dk1"/>
+                      </a:solidFill>
+                      <a:prstDash val="solid"/>
+                      <a:round/>
+                      <a:headEnd type="none" w="sm" len="sm"/>
+                      <a:tailEnd type="none" w="sm" len="sm"/>
+                    </a:lnT>
+                    <a:lnB w="12700" cap="flat" cmpd="sng">
+                      <a:solidFill>
+                        <a:schemeClr val="dk1"/>
+                      </a:solidFill>
+                      <a:prstDash val="solid"/>
+                      <a:round/>
+                      <a:headEnd type="none" w="sm" len="sm"/>
+                      <a:tailEnd type="none" w="sm" len="sm"/>
+                    </a:lnB>
+                    <a:solidFill>
+                      <a:srgbClr val="D8D8D8"/>
+                    </a:solidFill>
+                  </a:tcPr>
+                </a:tc>
+                <a:tc>
+                  <a:txBody>
+                    <a:bodyPr/>
+                    <a:lstStyle/>
+                    <a:p>
+                      <a:pPr marL="0" marR="0" lvl="0" indent="0" algn="ctr" rtl="0">
+                        <a:lnSpc>
+                          <a:spcPct val="100000"/>
+                        </a:lnSpc>
+                        <a:spcBef>
+                          <a:spcPts val="0"/>
+                        </a:spcBef>
+                        <a:spcAft>
+                          <a:spcPts val="0"/>
+                        </a:spcAft>
+                        <a:buClr>
+                          <a:srgbClr val="000000"/>
+                        </a:buClr>
+                        <a:buSzPts val="1500"/>
+                        <a:buFont typeface="Arial"/>
+                        <a:buNone/>
+                      </a:pPr>
+                      <a:endParaRPr sz="1500" b="0" u="none" strike="noStrike" cap="none">
+                        <a:solidFill>
+                          <a:schemeClr val="dk1"/>
+                        </a:solidFill>
+                      </a:endParaRPr>
+                    </a:p>
+                  </a:txBody>
+                  <a:tcPr marL="91450" marR="91450" marT="45725" marB="45725" anchor="ctr">
+                    <a:lnL w="12700" cap="flat" cmpd="sng">
+                      <a:solidFill>
+                        <a:schemeClr val="dk1"/>
+                      </a:solidFill>
+                      <a:prstDash val="solid"/>
+                      <a:round/>
+                      <a:headEnd type="none" w="sm" len="sm"/>
+                      <a:tailEnd type="none" w="sm" len="sm"/>
+                    </a:lnL>
+                    <a:lnR w="12700" cap="flat" cmpd="sng">
+                      <a:solidFill>
+                        <a:schemeClr val="dk1"/>
+                      </a:solidFill>
+                      <a:prstDash val="solid"/>
+                      <a:round/>
+                      <a:headEnd type="none" w="sm" len="sm"/>
+                      <a:tailEnd type="none" w="sm" len="sm"/>
+                    </a:lnR>
+                    <a:lnT w="12700" cap="flat" cmpd="sng">
+                      <a:solidFill>
+                        <a:schemeClr val="dk1"/>
+                      </a:solidFill>
+                      <a:prstDash val="solid"/>
+                      <a:round/>
+                      <a:headEnd type="none" w="sm" len="sm"/>
+                      <a:tailEnd type="none" w="sm" len="sm"/>
+                    </a:lnT>
+                    <a:lnB w="12700" cap="flat" cmpd="sng">
+                      <a:solidFill>
+                        <a:schemeClr val="dk1"/>
+                      </a:solidFill>
+                      <a:prstDash val="solid"/>
+                      <a:round/>
+                      <a:headEnd type="none" w="sm" len="sm"/>
+                      <a:tailEnd type="none" w="sm" len="sm"/>
+                    </a:lnB>
+                    <a:solidFill>
+                      <a:schemeClr val="lt1"/>
+                    </a:solidFill>
+                  </a:tcPr>
+                </a:tc>
+                <a:extLst>
+                  <a:ext uri="{0D108BD9-81ED-4DB2-BD59-A6C34878D82A}">
+                    <a16:rowId xmlns:a16="http://schemas.microsoft.com/office/drawing/2014/main" xmlns="" val="10000"/>
+                  </a:ext>
+                </a:extLst>
+              </a:tr>
+            </a:tbl>
+          </a:graphicData>
+        </a:graphic>
+      </p:graphicFrame>
+      <p:graphicFrame>
+        <p:nvGraphicFramePr>
+          <p:cNvPr id="169" name="Google Shape;169;g7c553259d1_0_81"/>
+          <p:cNvGraphicFramePr/>
+          <p:nvPr>
+            <p:extLst>
+              <p:ext uri="{D42A27DB-BD31-4B8C-83A1-F6EECF244321}">
+                <p14:modId xmlns:p14="http://schemas.microsoft.com/office/powerpoint/2010/main" val="1502046816"/>
+              </p:ext>
+            </p:extLst>
+          </p:nvPr>
+        </p:nvGraphicFramePr>
+        <p:xfrm>
+          <a:off x="8509686" y="1289960"/>
+          <a:ext cx="3532000" cy="3710057"/>
+        </p:xfrm>
+        <a:graphic>
+          <a:graphicData uri="http://schemas.openxmlformats.org/drawingml/2006/table">
+            <a:tbl>
+              <a:tblPr firstRow="1" bandRow="1">
+                <a:noFill/>
+              </a:tblPr>
+              <a:tblGrid>
+                <a:gridCol w="382900">
+                  <a:extLst>
+                    <a:ext uri="{9D8B030D-6E8A-4147-A177-3AD203B41FA5}">
+                      <a16:colId xmlns:a16="http://schemas.microsoft.com/office/drawing/2014/main" xmlns="" val="20000"/>
+                    </a:ext>
+                  </a:extLst>
+                </a:gridCol>
+                <a:gridCol w="3149100">
+                  <a:extLst>
+                    <a:ext uri="{9D8B030D-6E8A-4147-A177-3AD203B41FA5}">
+                      <a16:colId xmlns:a16="http://schemas.microsoft.com/office/drawing/2014/main" xmlns="" val="20001"/>
+                    </a:ext>
+                  </a:extLst>
+                </a:gridCol>
+              </a:tblGrid>
+              <a:tr h="326207">
+                <a:tc>
+                  <a:txBody>
+                    <a:bodyPr/>
+                    <a:lstStyle/>
+                    <a:p>
+                      <a:pPr marL="0" marR="0" lvl="0" indent="0" algn="ctr" rtl="0">
+                        <a:lnSpc>
+                          <a:spcPct val="100000"/>
+                        </a:lnSpc>
+                        <a:spcBef>
+                          <a:spcPts val="0"/>
+                        </a:spcBef>
+                        <a:spcAft>
+                          <a:spcPts val="0"/>
+                        </a:spcAft>
+                        <a:buClr>
+                          <a:srgbClr val="000000"/>
+                        </a:buClr>
+                        <a:buSzPts val="1500"/>
+                        <a:buFont typeface="Arial"/>
+                        <a:buNone/>
+                      </a:pPr>
+                      <a:r>
+                        <a:rPr lang="ko-KR" sz="1500" u="none" strike="noStrike" cap="none" dirty="0">
+                          <a:solidFill>
+                            <a:schemeClr val="dk1"/>
+                          </a:solidFill>
+                        </a:rPr>
+                        <a:t>#</a:t>
+                      </a:r>
+                      <a:endParaRPr sz="1500" u="none" strike="noStrike" cap="none" dirty="0">
+                        <a:solidFill>
+                          <a:schemeClr val="dk1"/>
+                        </a:solidFill>
+                      </a:endParaRPr>
+                    </a:p>
+                  </a:txBody>
+                  <a:tcPr marL="91450" marR="91450" marT="45725" marB="45725" anchor="ctr">
+                    <a:lnL w="12700" cap="flat" cmpd="sng">
+                      <a:solidFill>
+                        <a:schemeClr val="dk1"/>
+                      </a:solidFill>
+                      <a:prstDash val="solid"/>
+                      <a:round/>
+                      <a:headEnd type="none" w="sm" len="sm"/>
+                      <a:tailEnd type="none" w="sm" len="sm"/>
+                    </a:lnL>
+                    <a:lnR w="12700" cap="flat" cmpd="sng">
+                      <a:solidFill>
+                        <a:schemeClr val="dk1"/>
+                      </a:solidFill>
+                      <a:prstDash val="solid"/>
+                      <a:round/>
+                      <a:headEnd type="none" w="sm" len="sm"/>
+                      <a:tailEnd type="none" w="sm" len="sm"/>
+                    </a:lnR>
+                    <a:lnT w="12700" cap="flat" cmpd="sng">
+                      <a:solidFill>
+                        <a:schemeClr val="dk1"/>
+                      </a:solidFill>
+                      <a:prstDash val="solid"/>
+                      <a:round/>
+                      <a:headEnd type="none" w="sm" len="sm"/>
+                      <a:tailEnd type="none" w="sm" len="sm"/>
+                    </a:lnT>
+                    <a:lnB w="12700" cap="flat" cmpd="sng">
+                      <a:solidFill>
+                        <a:schemeClr val="dk1"/>
+                      </a:solidFill>
+                      <a:prstDash val="solid"/>
+                      <a:round/>
+                      <a:headEnd type="none" w="sm" len="sm"/>
+                      <a:tailEnd type="none" w="sm" len="sm"/>
+                    </a:lnB>
+                    <a:solidFill>
+                      <a:srgbClr val="D8D8D8"/>
+                    </a:solidFill>
+                  </a:tcPr>
+                </a:tc>
+                <a:tc>
+                  <a:txBody>
+                    <a:bodyPr/>
+                    <a:lstStyle/>
+                    <a:p>
+                      <a:pPr marL="0" marR="0" lvl="0" indent="0" algn="ctr" rtl="0">
+                        <a:lnSpc>
+                          <a:spcPct val="100000"/>
+                        </a:lnSpc>
+                        <a:spcBef>
+                          <a:spcPts val="0"/>
+                        </a:spcBef>
+                        <a:spcAft>
+                          <a:spcPts val="0"/>
+                        </a:spcAft>
+                        <a:buClr>
+                          <a:srgbClr val="000000"/>
+                        </a:buClr>
+                        <a:buSzPts val="1500"/>
+                        <a:buFont typeface="Arial"/>
+                        <a:buNone/>
+                      </a:pPr>
+                      <a:endParaRPr sz="1500" u="none" strike="noStrike" cap="none" dirty="0">
+                        <a:solidFill>
+                          <a:schemeClr val="dk1"/>
+                        </a:solidFill>
+                      </a:endParaRPr>
+                    </a:p>
+                  </a:txBody>
+                  <a:tcPr marL="91450" marR="91450" marT="45725" marB="45725" anchor="ctr">
+                    <a:lnL w="12700" cap="flat" cmpd="sng">
+                      <a:solidFill>
+                        <a:schemeClr val="dk1"/>
+                      </a:solidFill>
+                      <a:prstDash val="solid"/>
+                      <a:round/>
+                      <a:headEnd type="none" w="sm" len="sm"/>
+                      <a:tailEnd type="none" w="sm" len="sm"/>
+                    </a:lnL>
+                    <a:lnR w="12700" cap="flat" cmpd="sng">
+                      <a:solidFill>
+                        <a:schemeClr val="dk1"/>
+                      </a:solidFill>
+                      <a:prstDash val="solid"/>
+                      <a:round/>
+                      <a:headEnd type="none" w="sm" len="sm"/>
+                      <a:tailEnd type="none" w="sm" len="sm"/>
+                    </a:lnR>
+                    <a:lnT w="12700" cap="flat" cmpd="sng">
+                      <a:solidFill>
+                        <a:schemeClr val="dk1"/>
+                      </a:solidFill>
+                      <a:prstDash val="solid"/>
+                      <a:round/>
+                      <a:headEnd type="none" w="sm" len="sm"/>
+                      <a:tailEnd type="none" w="sm" len="sm"/>
+                    </a:lnT>
+                    <a:lnB w="12700" cap="flat" cmpd="sng">
+                      <a:solidFill>
+                        <a:schemeClr val="dk1"/>
+                      </a:solidFill>
+                      <a:prstDash val="solid"/>
+                      <a:round/>
+                      <a:headEnd type="none" w="sm" len="sm"/>
+                      <a:tailEnd type="none" w="sm" len="sm"/>
+                    </a:lnB>
+                    <a:solidFill>
+                      <a:srgbClr val="D8D8D8"/>
+                    </a:solidFill>
+                  </a:tcPr>
+                </a:tc>
+                <a:extLst>
+                  <a:ext uri="{0D108BD9-81ED-4DB2-BD59-A6C34878D82A}">
+                    <a16:rowId xmlns:a16="http://schemas.microsoft.com/office/drawing/2014/main" xmlns="" val="10000"/>
+                  </a:ext>
+                </a:extLst>
+              </a:tr>
+              <a:tr h="485007">
+                <a:tc>
+                  <a:txBody>
+                    <a:bodyPr/>
+                    <a:lstStyle/>
+                    <a:p>
+                      <a:pPr marL="0" marR="0" lvl="0" indent="0" algn="ctr" rtl="0">
+                        <a:lnSpc>
+                          <a:spcPct val="100000"/>
+                        </a:lnSpc>
+                        <a:spcBef>
+                          <a:spcPts val="0"/>
+                        </a:spcBef>
+                        <a:spcAft>
+                          <a:spcPts val="0"/>
+                        </a:spcAft>
+                        <a:buClr>
+                          <a:srgbClr val="000000"/>
+                        </a:buClr>
+                        <a:buSzPts val="1500"/>
+                        <a:buFont typeface="Arial"/>
+                        <a:buNone/>
+                      </a:pPr>
+                      <a:r>
+                        <a:rPr lang="en-US" altLang="ko-KR" sz="1500" dirty="0"/>
+                        <a:t>1</a:t>
+                      </a:r>
+                      <a:endParaRPr sz="1500" dirty="0"/>
+                    </a:p>
+                  </a:txBody>
+                  <a:tcPr marL="91450" marR="91450" marT="45725" marB="45725" anchor="ctr">
+                    <a:lnL w="12700" cap="flat" cmpd="sng">
+                      <a:solidFill>
+                        <a:schemeClr val="dk1"/>
+                      </a:solidFill>
+                      <a:prstDash val="solid"/>
+                      <a:round/>
+                      <a:headEnd type="none" w="sm" len="sm"/>
+                      <a:tailEnd type="none" w="sm" len="sm"/>
+                    </a:lnL>
+                    <a:lnR w="12700" cap="flat" cmpd="sng">
+                      <a:solidFill>
+                        <a:schemeClr val="dk1"/>
+                      </a:solidFill>
+                      <a:prstDash val="solid"/>
+                      <a:round/>
+                      <a:headEnd type="none" w="sm" len="sm"/>
+                      <a:tailEnd type="none" w="sm" len="sm"/>
+                    </a:lnR>
+                    <a:lnT w="12700" cap="flat" cmpd="sng">
+                      <a:solidFill>
+                        <a:schemeClr val="dk1"/>
+                      </a:solidFill>
+                      <a:prstDash val="solid"/>
+                      <a:round/>
+                      <a:headEnd type="none" w="sm" len="sm"/>
+                      <a:tailEnd type="none" w="sm" len="sm"/>
+                    </a:lnT>
+                    <a:lnB w="12700" cap="flat" cmpd="sng">
+                      <a:solidFill>
+                        <a:schemeClr val="dk1"/>
+                      </a:solidFill>
+                      <a:prstDash val="solid"/>
+                      <a:round/>
+                      <a:headEnd type="none" w="sm" len="sm"/>
+                      <a:tailEnd type="none" w="sm" len="sm"/>
+                    </a:lnB>
+                    <a:solidFill>
+                      <a:schemeClr val="lt1"/>
+                    </a:solidFill>
+                  </a:tcPr>
+                </a:tc>
+                <a:tc>
+                  <a:txBody>
+                    <a:bodyPr/>
+                    <a:lstStyle/>
+                    <a:p>
+                      <a:pPr marL="0" marR="0" lvl="0" indent="0" algn="l">
+                        <a:lnSpc>
+                          <a:spcPct val="100000"/>
+                        </a:lnSpc>
+                        <a:spcBef>
+                          <a:spcPts val="0"/>
+                        </a:spcBef>
+                        <a:spcAft>
+                          <a:spcPts val="0"/>
+                        </a:spcAft>
+                        <a:buNone/>
+                      </a:pPr>
+                      <a:endParaRPr altLang="en-US" sz="1500" b="0" i="0" u="none" strike="noStrike" cap="none" noProof="0" dirty="0">
+                        <a:latin typeface="맑은 고딕"/>
+                      </a:endParaRPr>
+                    </a:p>
+                  </a:txBody>
+                  <a:tcPr marL="91450" marR="91450" marT="45725" marB="45725">
+                    <a:lnL w="12700" cap="flat" cmpd="sng">
+                      <a:solidFill>
+                        <a:schemeClr val="dk1"/>
+                      </a:solidFill>
+                      <a:prstDash val="solid"/>
+                      <a:round/>
+                      <a:headEnd type="none" w="sm" len="sm"/>
+                      <a:tailEnd type="none" w="sm" len="sm"/>
+                    </a:lnL>
+                    <a:lnR w="12700" cap="flat" cmpd="sng">
+                      <a:solidFill>
+                        <a:schemeClr val="dk1"/>
+                      </a:solidFill>
+                      <a:prstDash val="solid"/>
+                      <a:round/>
+                      <a:headEnd type="none" w="sm" len="sm"/>
+                      <a:tailEnd type="none" w="sm" len="sm"/>
+                    </a:lnR>
+                    <a:lnT w="12700" cap="flat" cmpd="sng">
+                      <a:solidFill>
+                        <a:schemeClr val="dk1"/>
+                      </a:solidFill>
+                      <a:prstDash val="solid"/>
+                      <a:round/>
+                      <a:headEnd type="none" w="sm" len="sm"/>
+                      <a:tailEnd type="none" w="sm" len="sm"/>
+                    </a:lnT>
+                    <a:lnB w="12700" cap="flat" cmpd="sng">
+                      <a:solidFill>
+                        <a:schemeClr val="dk1"/>
+                      </a:solidFill>
+                      <a:prstDash val="solid"/>
+                      <a:round/>
+                      <a:headEnd type="none" w="sm" len="sm"/>
+                      <a:tailEnd type="none" w="sm" len="sm"/>
+                    </a:lnB>
+                    <a:solidFill>
+                      <a:schemeClr val="lt1"/>
+                    </a:solidFill>
+                  </a:tcPr>
+                </a:tc>
+                <a:extLst>
+                  <a:ext uri="{0D108BD9-81ED-4DB2-BD59-A6C34878D82A}">
+                    <a16:rowId xmlns:a16="http://schemas.microsoft.com/office/drawing/2014/main" xmlns="" val="10001"/>
+                  </a:ext>
+                </a:extLst>
+              </a:tr>
+              <a:tr h="446498">
+                <a:tc>
+                  <a:txBody>
+                    <a:bodyPr/>
+                    <a:lstStyle/>
+                    <a:p>
+                      <a:pPr marL="0" marR="0" lvl="0" indent="0" algn="ctr" rtl="0">
+                        <a:lnSpc>
+                          <a:spcPct val="100000"/>
+                        </a:lnSpc>
+                        <a:spcBef>
+                          <a:spcPts val="0"/>
+                        </a:spcBef>
+                        <a:spcAft>
+                          <a:spcPts val="0"/>
+                        </a:spcAft>
+                        <a:buClr>
+                          <a:srgbClr val="000000"/>
+                        </a:buClr>
+                        <a:buSzPts val="1500"/>
+                        <a:buFont typeface="Arial"/>
+                        <a:buNone/>
+                      </a:pPr>
+                      <a:r>
+                        <a:rPr lang="en-US" altLang="ko-KR" sz="1500" u="none" strike="noStrike" cap="none" dirty="0">
+                          <a:solidFill>
+                            <a:schemeClr val="dk1"/>
+                          </a:solidFill>
+                        </a:rPr>
+                        <a:t>2</a:t>
+                      </a:r>
+                      <a:endParaRPr sz="1500" u="none" strike="noStrike" cap="none" dirty="0">
+                        <a:solidFill>
+                          <a:schemeClr val="dk1"/>
+                        </a:solidFill>
+                      </a:endParaRPr>
+                    </a:p>
+                  </a:txBody>
+                  <a:tcPr marL="91450" marR="91450" marT="45725" marB="45725" anchor="ctr">
+                    <a:lnL w="12700" cap="flat" cmpd="sng">
+                      <a:solidFill>
+                        <a:schemeClr val="dk1"/>
+                      </a:solidFill>
+                      <a:prstDash val="solid"/>
+                      <a:round/>
+                      <a:headEnd type="none" w="sm" len="sm"/>
+                      <a:tailEnd type="none" w="sm" len="sm"/>
+                    </a:lnL>
+                    <a:lnR w="12700" cap="flat" cmpd="sng">
+                      <a:solidFill>
+                        <a:schemeClr val="dk1"/>
+                      </a:solidFill>
+                      <a:prstDash val="solid"/>
+                      <a:round/>
+                      <a:headEnd type="none" w="sm" len="sm"/>
+                      <a:tailEnd type="none" w="sm" len="sm"/>
+                    </a:lnR>
+                    <a:lnT w="12700" cap="flat" cmpd="sng">
+                      <a:solidFill>
+                        <a:schemeClr val="dk1"/>
+                      </a:solidFill>
+                      <a:prstDash val="solid"/>
+                      <a:round/>
+                      <a:headEnd type="none" w="sm" len="sm"/>
+                      <a:tailEnd type="none" w="sm" len="sm"/>
+                    </a:lnT>
+                    <a:lnB w="12700" cap="flat" cmpd="sng">
+                      <a:solidFill>
+                        <a:schemeClr val="dk1"/>
+                      </a:solidFill>
+                      <a:prstDash val="solid"/>
+                      <a:round/>
+                      <a:headEnd type="none" w="sm" len="sm"/>
+                      <a:tailEnd type="none" w="sm" len="sm"/>
+                    </a:lnB>
+                    <a:solidFill>
+                      <a:schemeClr val="lt1"/>
+                    </a:solidFill>
+                  </a:tcPr>
+                </a:tc>
+                <a:tc>
+                  <a:txBody>
+                    <a:bodyPr/>
+                    <a:lstStyle/>
+                    <a:p>
+                      <a:pPr marL="0" marR="0" lvl="0" indent="0" algn="l">
+                        <a:lnSpc>
+                          <a:spcPct val="100000"/>
+                        </a:lnSpc>
+                        <a:spcBef>
+                          <a:spcPts val="0"/>
+                        </a:spcBef>
+                        <a:spcAft>
+                          <a:spcPts val="0"/>
+                        </a:spcAft>
+                        <a:buNone/>
+                      </a:pPr>
+                      <a:endParaRPr lang="ko-KR" altLang="en-US" sz="1500" b="0" i="0" u="none" strike="noStrike" cap="none" noProof="0" dirty="0">
+                        <a:latin typeface="Malgun Gothic"/>
+                        <a:ea typeface="Malgun Gothic"/>
+                      </a:endParaRPr>
+                    </a:p>
+                  </a:txBody>
+                  <a:tcPr marL="91450" marR="91450" marT="45725" marB="45725">
+                    <a:lnL w="12700" cap="flat" cmpd="sng">
+                      <a:solidFill>
+                        <a:schemeClr val="dk1"/>
+                      </a:solidFill>
+                      <a:prstDash val="solid"/>
+                      <a:round/>
+                      <a:headEnd type="none" w="sm" len="sm"/>
+                      <a:tailEnd type="none" w="sm" len="sm"/>
+                    </a:lnL>
+                    <a:lnR w="12700" cap="flat" cmpd="sng">
+                      <a:solidFill>
+                        <a:schemeClr val="dk1"/>
+                      </a:solidFill>
+                      <a:prstDash val="solid"/>
+                      <a:round/>
+                      <a:headEnd type="none" w="sm" len="sm"/>
+                      <a:tailEnd type="none" w="sm" len="sm"/>
+                    </a:lnR>
+                    <a:lnT w="12700" cap="flat" cmpd="sng">
+                      <a:solidFill>
+                        <a:schemeClr val="dk1"/>
+                      </a:solidFill>
+                      <a:prstDash val="solid"/>
+                      <a:round/>
+                      <a:headEnd type="none" w="sm" len="sm"/>
+                      <a:tailEnd type="none" w="sm" len="sm"/>
+                    </a:lnT>
+                    <a:lnB w="12700" cap="flat" cmpd="sng">
+                      <a:solidFill>
+                        <a:schemeClr val="dk1"/>
+                      </a:solidFill>
+                      <a:prstDash val="solid"/>
+                      <a:round/>
+                      <a:headEnd type="none" w="sm" len="sm"/>
+                      <a:tailEnd type="none" w="sm" len="sm"/>
+                    </a:lnB>
+                    <a:solidFill>
+                      <a:schemeClr val="lt1"/>
+                    </a:solidFill>
+                  </a:tcPr>
+                </a:tc>
+                <a:extLst>
+                  <a:ext uri="{0D108BD9-81ED-4DB2-BD59-A6C34878D82A}">
+                    <a16:rowId xmlns:a16="http://schemas.microsoft.com/office/drawing/2014/main" xmlns="" val="10002"/>
+                  </a:ext>
+                </a:extLst>
+              </a:tr>
+              <a:tr h="516541">
+                <a:tc>
+                  <a:txBody>
+                    <a:bodyPr/>
+                    <a:lstStyle/>
+                    <a:p>
+                      <a:pPr marL="0" marR="0" lvl="0" indent="0" algn="ctr" rtl="0">
+                        <a:lnSpc>
+                          <a:spcPct val="100000"/>
+                        </a:lnSpc>
+                        <a:spcBef>
+                          <a:spcPts val="0"/>
+                        </a:spcBef>
+                        <a:spcAft>
+                          <a:spcPts val="0"/>
+                        </a:spcAft>
+                        <a:buClr>
+                          <a:srgbClr val="000000"/>
+                        </a:buClr>
+                        <a:buSzPts val="1500"/>
+                        <a:buFont typeface="Arial"/>
+                        <a:buNone/>
+                      </a:pPr>
+                      <a:r>
+                        <a:rPr lang="en-US" altLang="ko-KR" sz="1500" u="none" strike="noStrike" cap="none" dirty="0">
+                          <a:solidFill>
+                            <a:schemeClr val="dk1"/>
+                          </a:solidFill>
+                        </a:rPr>
+                        <a:t>3</a:t>
+                      </a:r>
+                      <a:endParaRPr sz="1500" u="none" strike="noStrike" cap="none" dirty="0">
+                        <a:solidFill>
+                          <a:schemeClr val="dk1"/>
+                        </a:solidFill>
+                      </a:endParaRPr>
+                    </a:p>
+                  </a:txBody>
+                  <a:tcPr marL="91450" marR="91450" marT="45725" marB="45725" anchor="ctr">
+                    <a:lnL w="12700" cap="flat" cmpd="sng">
+                      <a:solidFill>
+                        <a:schemeClr val="dk1"/>
+                      </a:solidFill>
+                      <a:prstDash val="solid"/>
+                      <a:round/>
+                      <a:headEnd type="none" w="sm" len="sm"/>
+                      <a:tailEnd type="none" w="sm" len="sm"/>
+                    </a:lnL>
+                    <a:lnR w="12700" cap="flat" cmpd="sng">
+                      <a:solidFill>
+                        <a:schemeClr val="dk1"/>
+                      </a:solidFill>
+                      <a:prstDash val="solid"/>
+                      <a:round/>
+                      <a:headEnd type="none" w="sm" len="sm"/>
+                      <a:tailEnd type="none" w="sm" len="sm"/>
+                    </a:lnR>
+                    <a:lnT w="12700" cap="flat" cmpd="sng">
+                      <a:solidFill>
+                        <a:schemeClr val="dk1"/>
+                      </a:solidFill>
+                      <a:prstDash val="solid"/>
+                      <a:round/>
+                      <a:headEnd type="none" w="sm" len="sm"/>
+                      <a:tailEnd type="none" w="sm" len="sm"/>
+                    </a:lnT>
+                    <a:lnB w="12700" cap="flat" cmpd="sng">
+                      <a:solidFill>
+                        <a:schemeClr val="dk1"/>
+                      </a:solidFill>
+                      <a:prstDash val="solid"/>
+                      <a:round/>
+                      <a:headEnd type="none" w="sm" len="sm"/>
+                      <a:tailEnd type="none" w="sm" len="sm"/>
+                    </a:lnB>
+                    <a:solidFill>
+                      <a:schemeClr val="lt1"/>
+                    </a:solidFill>
+                  </a:tcPr>
+                </a:tc>
+                <a:tc>
+                  <a:txBody>
+                    <a:bodyPr/>
+                    <a:lstStyle/>
+                    <a:p>
+                      <a:pPr marL="0" marR="0" lvl="0" indent="0" algn="l" rtl="0">
+                        <a:lnSpc>
+                          <a:spcPct val="100000"/>
+                        </a:lnSpc>
+                        <a:spcBef>
+                          <a:spcPts val="0"/>
+                        </a:spcBef>
+                        <a:spcAft>
+                          <a:spcPts val="0"/>
+                        </a:spcAft>
+                        <a:buFont typeface="Arial"/>
+                        <a:buNone/>
+                      </a:pPr>
+                      <a:endParaRPr sz="1500" u="none" strike="noStrike" cap="none" dirty="0">
+                        <a:solidFill>
+                          <a:schemeClr val="dk1"/>
+                        </a:solidFill>
+                      </a:endParaRPr>
+                    </a:p>
+                  </a:txBody>
+                  <a:tcPr marL="91450" marR="91450" marT="45725" marB="45725">
+                    <a:lnL w="12700" cap="flat" cmpd="sng">
+                      <a:solidFill>
+                        <a:schemeClr val="dk1"/>
+                      </a:solidFill>
+                      <a:prstDash val="solid"/>
+                      <a:round/>
+                      <a:headEnd type="none" w="sm" len="sm"/>
+                      <a:tailEnd type="none" w="sm" len="sm"/>
+                    </a:lnL>
+                    <a:lnR w="12700" cap="flat" cmpd="sng">
+                      <a:solidFill>
+                        <a:schemeClr val="dk1"/>
+                      </a:solidFill>
+                      <a:prstDash val="solid"/>
+                      <a:round/>
+                      <a:headEnd type="none" w="sm" len="sm"/>
+                      <a:tailEnd type="none" w="sm" len="sm"/>
+                    </a:lnR>
+                    <a:lnT w="12700" cap="flat" cmpd="sng">
+                      <a:solidFill>
+                        <a:schemeClr val="dk1"/>
+                      </a:solidFill>
+                      <a:prstDash val="solid"/>
+                      <a:round/>
+                      <a:headEnd type="none" w="sm" len="sm"/>
+                      <a:tailEnd type="none" w="sm" len="sm"/>
+                    </a:lnT>
+                    <a:lnB w="12700" cap="flat" cmpd="sng">
+                      <a:solidFill>
+                        <a:schemeClr val="dk1"/>
+                      </a:solidFill>
+                      <a:prstDash val="solid"/>
+                      <a:round/>
+                      <a:headEnd type="none" w="sm" len="sm"/>
+                      <a:tailEnd type="none" w="sm" len="sm"/>
+                    </a:lnB>
+                    <a:solidFill>
+                      <a:schemeClr val="lt1"/>
+                    </a:solidFill>
+                  </a:tcPr>
+                </a:tc>
+                <a:extLst>
+                  <a:ext uri="{0D108BD9-81ED-4DB2-BD59-A6C34878D82A}">
+                    <a16:rowId xmlns:a16="http://schemas.microsoft.com/office/drawing/2014/main" xmlns="" val="10003"/>
+                  </a:ext>
+                </a:extLst>
+              </a:tr>
+              <a:tr h="457200">
+                <a:tc>
+                  <a:txBody>
+                    <a:bodyPr/>
+                    <a:lstStyle/>
+                    <a:p>
+                      <a:pPr marL="0" marR="0" lvl="0" indent="0" algn="ctr" rtl="0">
+                        <a:lnSpc>
+                          <a:spcPct val="100000"/>
+                        </a:lnSpc>
+                        <a:spcBef>
+                          <a:spcPts val="0"/>
+                        </a:spcBef>
+                        <a:spcAft>
+                          <a:spcPts val="0"/>
+                        </a:spcAft>
+                        <a:buClr>
+                          <a:srgbClr val="000000"/>
+                        </a:buClr>
+                        <a:buSzPts val="1500"/>
+                        <a:buFont typeface="Arial"/>
+                        <a:buNone/>
+                      </a:pPr>
+                      <a:r>
+                        <a:rPr lang="en-US" sz="1500" u="none" strike="noStrike" cap="none" dirty="0" smtClean="0">
+                          <a:solidFill>
+                            <a:schemeClr val="dk1"/>
+                          </a:solidFill>
+                        </a:rPr>
+                        <a:t>4</a:t>
+                      </a:r>
+                      <a:endParaRPr sz="1500" u="none" strike="noStrike" cap="none" dirty="0">
+                        <a:solidFill>
+                          <a:schemeClr val="dk1"/>
+                        </a:solidFill>
+                      </a:endParaRPr>
+                    </a:p>
+                  </a:txBody>
+                  <a:tcPr marL="91450" marR="91450" marT="45725" marB="45725" anchor="ctr">
+                    <a:lnL w="12700" cap="flat" cmpd="sng">
+                      <a:solidFill>
+                        <a:schemeClr val="dk1"/>
+                      </a:solidFill>
+                      <a:prstDash val="solid"/>
+                      <a:round/>
+                      <a:headEnd type="none" w="sm" len="sm"/>
+                      <a:tailEnd type="none" w="sm" len="sm"/>
+                    </a:lnL>
+                    <a:lnR w="12700" cap="flat" cmpd="sng">
+                      <a:solidFill>
+                        <a:schemeClr val="dk1"/>
+                      </a:solidFill>
+                      <a:prstDash val="solid"/>
+                      <a:round/>
+                      <a:headEnd type="none" w="sm" len="sm"/>
+                      <a:tailEnd type="none" w="sm" len="sm"/>
+                    </a:lnR>
+                    <a:lnT w="12700" cap="flat" cmpd="sng">
+                      <a:solidFill>
+                        <a:schemeClr val="dk1"/>
+                      </a:solidFill>
+                      <a:prstDash val="solid"/>
+                      <a:round/>
+                      <a:headEnd type="none" w="sm" len="sm"/>
+                      <a:tailEnd type="none" w="sm" len="sm"/>
+                    </a:lnT>
+                    <a:lnB w="12700" cap="flat" cmpd="sng">
+                      <a:solidFill>
+                        <a:schemeClr val="dk1"/>
+                      </a:solidFill>
+                      <a:prstDash val="solid"/>
+                      <a:round/>
+                      <a:headEnd type="none" w="sm" len="sm"/>
+                      <a:tailEnd type="none" w="sm" len="sm"/>
+                    </a:lnB>
+                    <a:solidFill>
+                      <a:schemeClr val="lt1"/>
+                    </a:solidFill>
+                  </a:tcPr>
+                </a:tc>
+                <a:tc>
+                  <a:txBody>
+                    <a:bodyPr/>
+                    <a:lstStyle/>
+                    <a:p>
+                      <a:pPr marL="0" marR="0" lvl="0" indent="0" algn="l" rtl="0">
+                        <a:lnSpc>
+                          <a:spcPct val="100000"/>
+                        </a:lnSpc>
+                        <a:spcBef>
+                          <a:spcPts val="0"/>
+                        </a:spcBef>
+                        <a:spcAft>
+                          <a:spcPts val="0"/>
+                        </a:spcAft>
+                        <a:buNone/>
+                      </a:pPr>
+                      <a:endParaRPr lang="en-US" altLang="ko-KR" sz="1500" u="none" strike="noStrike" cap="none" dirty="0" smtClean="0">
+                        <a:solidFill>
+                          <a:schemeClr val="dk1"/>
+                        </a:solidFill>
+                      </a:endParaRPr>
+                    </a:p>
+                  </a:txBody>
+                  <a:tcPr marL="91450" marR="91450" marT="45725" marB="45725">
+                    <a:lnL w="12700" cap="flat" cmpd="sng">
+                      <a:solidFill>
+                        <a:schemeClr val="dk1"/>
+                      </a:solidFill>
+                      <a:prstDash val="solid"/>
+                      <a:round/>
+                      <a:headEnd type="none" w="sm" len="sm"/>
+                      <a:tailEnd type="none" w="sm" len="sm"/>
+                    </a:lnL>
+                    <a:lnR w="12700" cap="flat" cmpd="sng">
+                      <a:solidFill>
+                        <a:schemeClr val="dk1"/>
+                      </a:solidFill>
+                      <a:prstDash val="solid"/>
+                      <a:round/>
+                      <a:headEnd type="none" w="sm" len="sm"/>
+                      <a:tailEnd type="none" w="sm" len="sm"/>
+                    </a:lnR>
+                    <a:lnT w="12700" cap="flat" cmpd="sng">
+                      <a:solidFill>
+                        <a:schemeClr val="dk1"/>
+                      </a:solidFill>
+                      <a:prstDash val="solid"/>
+                      <a:round/>
+                      <a:headEnd type="none" w="sm" len="sm"/>
+                      <a:tailEnd type="none" w="sm" len="sm"/>
+                    </a:lnT>
+                    <a:lnB w="12700" cap="flat" cmpd="sng">
+                      <a:solidFill>
+                        <a:schemeClr val="dk1"/>
+                      </a:solidFill>
+                      <a:prstDash val="solid"/>
+                      <a:round/>
+                      <a:headEnd type="none" w="sm" len="sm"/>
+                      <a:tailEnd type="none" w="sm" len="sm"/>
+                    </a:lnB>
+                    <a:solidFill>
+                      <a:schemeClr val="lt1"/>
+                    </a:solidFill>
+                  </a:tcPr>
+                </a:tc>
+                <a:extLst>
+                  <a:ext uri="{0D108BD9-81ED-4DB2-BD59-A6C34878D82A}">
+                    <a16:rowId xmlns:a16="http://schemas.microsoft.com/office/drawing/2014/main" xmlns="" val="10004"/>
+                  </a:ext>
+                </a:extLst>
+              </a:tr>
+              <a:tr h="482048">
+                <a:tc>
+                  <a:txBody>
+                    <a:bodyPr/>
+                    <a:lstStyle/>
+                    <a:p>
+                      <a:pPr marL="0" marR="0" lvl="0" indent="0" algn="ctr" rtl="0">
+                        <a:lnSpc>
+                          <a:spcPct val="100000"/>
+                        </a:lnSpc>
+                        <a:spcBef>
+                          <a:spcPts val="0"/>
+                        </a:spcBef>
+                        <a:spcAft>
+                          <a:spcPts val="0"/>
+                        </a:spcAft>
+                        <a:buClr>
+                          <a:srgbClr val="000000"/>
+                        </a:buClr>
+                        <a:buSzPts val="1500"/>
+                        <a:buFont typeface="Arial"/>
+                        <a:buNone/>
+                      </a:pPr>
+                      <a:r>
+                        <a:rPr lang="en-US" sz="1500" u="none" strike="noStrike" cap="none" dirty="0" smtClean="0">
+                          <a:solidFill>
+                            <a:schemeClr val="dk1"/>
+                          </a:solidFill>
+                        </a:rPr>
+                        <a:t>5</a:t>
+                      </a:r>
+                      <a:endParaRPr sz="1500" u="none" strike="noStrike" cap="none" dirty="0">
+                        <a:solidFill>
+                          <a:schemeClr val="dk1"/>
+                        </a:solidFill>
+                      </a:endParaRPr>
+                    </a:p>
+                  </a:txBody>
+                  <a:tcPr marL="91450" marR="91450" marT="45725" marB="45725" anchor="ctr">
+                    <a:lnL w="12700" cap="flat" cmpd="sng">
+                      <a:solidFill>
+                        <a:schemeClr val="dk1"/>
+                      </a:solidFill>
+                      <a:prstDash val="solid"/>
+                      <a:round/>
+                      <a:headEnd type="none" w="sm" len="sm"/>
+                      <a:tailEnd type="none" w="sm" len="sm"/>
+                    </a:lnL>
+                    <a:lnR w="12700" cap="flat" cmpd="sng">
+                      <a:solidFill>
+                        <a:schemeClr val="dk1"/>
+                      </a:solidFill>
+                      <a:prstDash val="solid"/>
+                      <a:round/>
+                      <a:headEnd type="none" w="sm" len="sm"/>
+                      <a:tailEnd type="none" w="sm" len="sm"/>
+                    </a:lnR>
+                    <a:lnT w="12700" cap="flat" cmpd="sng">
+                      <a:solidFill>
+                        <a:schemeClr val="dk1"/>
+                      </a:solidFill>
+                      <a:prstDash val="solid"/>
+                      <a:round/>
+                      <a:headEnd type="none" w="sm" len="sm"/>
+                      <a:tailEnd type="none" w="sm" len="sm"/>
+                    </a:lnT>
+                    <a:lnB w="12700" cap="flat" cmpd="sng">
+                      <a:solidFill>
+                        <a:schemeClr val="dk1"/>
+                      </a:solidFill>
+                      <a:prstDash val="solid"/>
+                      <a:round/>
+                      <a:headEnd type="none" w="sm" len="sm"/>
+                      <a:tailEnd type="none" w="sm" len="sm"/>
+                    </a:lnB>
+                    <a:solidFill>
+                      <a:schemeClr val="lt1"/>
+                    </a:solidFill>
+                  </a:tcPr>
+                </a:tc>
+                <a:tc>
+                  <a:txBody>
+                    <a:bodyPr/>
+                    <a:lstStyle/>
+                    <a:p>
+                      <a:pPr marL="0" marR="0" lvl="0" indent="0" algn="l" defTabSz="914400" rtl="0" eaLnBrk="1" fontAlgn="auto" latinLnBrk="1" hangingPunct="1">
+                        <a:lnSpc>
+                          <a:spcPct val="100000"/>
+                        </a:lnSpc>
+                        <a:spcBef>
+                          <a:spcPts val="0"/>
+                        </a:spcBef>
+                        <a:spcAft>
+                          <a:spcPts val="0"/>
+                        </a:spcAft>
+                        <a:buClr>
+                          <a:srgbClr val="000000"/>
+                        </a:buClr>
+                        <a:buSzPts val="1500"/>
+                        <a:buFont typeface="Arial"/>
+                        <a:buNone/>
+                        <a:tabLst/>
+                        <a:defRPr/>
+                      </a:pPr>
+                      <a:endParaRPr lang="ko-KR" altLang="en-US" sz="1500" u="none" strike="noStrike" cap="none" dirty="0" smtClean="0">
+                        <a:solidFill>
+                          <a:schemeClr val="dk1"/>
+                        </a:solidFill>
+                      </a:endParaRPr>
+                    </a:p>
+                  </a:txBody>
+                  <a:tcPr marL="91450" marR="91450" marT="45725" marB="45725">
+                    <a:lnL w="12700" cap="flat" cmpd="sng">
+                      <a:solidFill>
+                        <a:schemeClr val="dk1"/>
+                      </a:solidFill>
+                      <a:prstDash val="solid"/>
+                      <a:round/>
+                      <a:headEnd type="none" w="sm" len="sm"/>
+                      <a:tailEnd type="none" w="sm" len="sm"/>
+                    </a:lnL>
+                    <a:lnR w="12700" cap="flat" cmpd="sng">
+                      <a:solidFill>
+                        <a:schemeClr val="dk1"/>
+                      </a:solidFill>
+                      <a:prstDash val="solid"/>
+                      <a:round/>
+                      <a:headEnd type="none" w="sm" len="sm"/>
+                      <a:tailEnd type="none" w="sm" len="sm"/>
+                    </a:lnR>
+                    <a:lnT w="12700" cap="flat" cmpd="sng">
+                      <a:solidFill>
+                        <a:schemeClr val="dk1"/>
+                      </a:solidFill>
+                      <a:prstDash val="solid"/>
+                      <a:round/>
+                      <a:headEnd type="none" w="sm" len="sm"/>
+                      <a:tailEnd type="none" w="sm" len="sm"/>
+                    </a:lnT>
+                    <a:lnB w="12700" cap="flat" cmpd="sng">
+                      <a:solidFill>
+                        <a:schemeClr val="dk1"/>
+                      </a:solidFill>
+                      <a:prstDash val="solid"/>
+                      <a:round/>
+                      <a:headEnd type="none" w="sm" len="sm"/>
+                      <a:tailEnd type="none" w="sm" len="sm"/>
+                    </a:lnB>
+                    <a:solidFill>
+                      <a:schemeClr val="lt1"/>
+                    </a:solidFill>
+                  </a:tcPr>
+                </a:tc>
+                <a:extLst>
+                  <a:ext uri="{0D108BD9-81ED-4DB2-BD59-A6C34878D82A}">
+                    <a16:rowId xmlns:a16="http://schemas.microsoft.com/office/drawing/2014/main" xmlns="" val="10005"/>
+                  </a:ext>
+                </a:extLst>
+              </a:tr>
+              <a:tr h="490718">
+                <a:tc>
+                  <a:txBody>
+                    <a:bodyPr/>
+                    <a:lstStyle/>
+                    <a:p>
+                      <a:pPr marL="0" marR="0" lvl="0" indent="0" algn="ctr" rtl="0">
+                        <a:lnSpc>
+                          <a:spcPct val="100000"/>
+                        </a:lnSpc>
+                        <a:spcBef>
+                          <a:spcPts val="0"/>
+                        </a:spcBef>
+                        <a:spcAft>
+                          <a:spcPts val="0"/>
+                        </a:spcAft>
+                        <a:buNone/>
+                      </a:pPr>
+                      <a:endParaRPr sz="1500" dirty="0"/>
+                    </a:p>
+                  </a:txBody>
+                  <a:tcPr marL="91450" marR="91450" marT="45725" marB="45725" anchor="ctr">
+                    <a:lnL w="12700" cap="flat" cmpd="sng">
+                      <a:solidFill>
+                        <a:schemeClr val="dk1"/>
+                      </a:solidFill>
+                      <a:prstDash val="solid"/>
+                      <a:round/>
+                      <a:headEnd type="none" w="sm" len="sm"/>
+                      <a:tailEnd type="none" w="sm" len="sm"/>
+                    </a:lnL>
+                    <a:lnR w="12700" cap="flat" cmpd="sng">
+                      <a:solidFill>
+                        <a:schemeClr val="dk1"/>
+                      </a:solidFill>
+                      <a:prstDash val="solid"/>
+                      <a:round/>
+                      <a:headEnd type="none" w="sm" len="sm"/>
+                      <a:tailEnd type="none" w="sm" len="sm"/>
+                    </a:lnR>
+                    <a:lnT w="12700" cap="flat" cmpd="sng">
+                      <a:solidFill>
+                        <a:schemeClr val="dk1"/>
+                      </a:solidFill>
+                      <a:prstDash val="solid"/>
+                      <a:round/>
+                      <a:headEnd type="none" w="sm" len="sm"/>
+                      <a:tailEnd type="none" w="sm" len="sm"/>
+                    </a:lnT>
+                    <a:lnB w="12700" cap="flat" cmpd="sng" algn="ctr">
+                      <a:solidFill>
+                        <a:schemeClr val="dk1"/>
+                      </a:solidFill>
+                      <a:prstDash val="solid"/>
+                      <a:round/>
+                      <a:headEnd type="none" w="sm" len="sm"/>
+                      <a:tailEnd type="none" w="sm" len="sm"/>
+                    </a:lnB>
+                    <a:solidFill>
+                      <a:schemeClr val="lt1"/>
+                    </a:solidFill>
+                  </a:tcPr>
+                </a:tc>
+                <a:tc>
+                  <a:txBody>
+                    <a:bodyPr/>
+                    <a:lstStyle/>
+                    <a:p>
+                      <a:pPr marL="0" marR="0" lvl="0" indent="0" algn="l" rtl="0">
+                        <a:lnSpc>
+                          <a:spcPct val="100000"/>
+                        </a:lnSpc>
+                        <a:spcBef>
+                          <a:spcPts val="0"/>
+                        </a:spcBef>
+                        <a:spcAft>
+                          <a:spcPts val="0"/>
+                        </a:spcAft>
+                        <a:buNone/>
+                      </a:pPr>
+                      <a:endParaRPr sz="1500" dirty="0"/>
+                    </a:p>
+                  </a:txBody>
+                  <a:tcPr marL="91450" marR="91450" marT="45725" marB="45725">
+                    <a:lnL w="12700" cap="flat" cmpd="sng">
+                      <a:solidFill>
+                        <a:schemeClr val="dk1"/>
+                      </a:solidFill>
+                      <a:prstDash val="solid"/>
+                      <a:round/>
+                      <a:headEnd type="none" w="sm" len="sm"/>
+                      <a:tailEnd type="none" w="sm" len="sm"/>
+                    </a:lnL>
+                    <a:lnR w="12700" cap="flat" cmpd="sng">
+                      <a:solidFill>
+                        <a:schemeClr val="dk1"/>
+                      </a:solidFill>
+                      <a:prstDash val="solid"/>
+                      <a:round/>
+                      <a:headEnd type="none" w="sm" len="sm"/>
+                      <a:tailEnd type="none" w="sm" len="sm"/>
+                    </a:lnR>
+                    <a:lnT w="12700" cap="flat" cmpd="sng">
+                      <a:solidFill>
+                        <a:schemeClr val="dk1"/>
+                      </a:solidFill>
+                      <a:prstDash val="solid"/>
+                      <a:round/>
+                      <a:headEnd type="none" w="sm" len="sm"/>
+                      <a:tailEnd type="none" w="sm" len="sm"/>
+                    </a:lnT>
+                    <a:lnB w="12700" cap="flat" cmpd="sng" algn="ctr">
+                      <a:solidFill>
+                        <a:schemeClr val="dk1"/>
+                      </a:solidFill>
+                      <a:prstDash val="solid"/>
+                      <a:round/>
+                      <a:headEnd type="none" w="sm" len="sm"/>
+                      <a:tailEnd type="none" w="sm" len="sm"/>
+                    </a:lnB>
+                    <a:solidFill>
+                      <a:schemeClr val="lt1"/>
+                    </a:solidFill>
+                  </a:tcPr>
+                </a:tc>
+                <a:extLst>
+                  <a:ext uri="{0D108BD9-81ED-4DB2-BD59-A6C34878D82A}">
+                    <a16:rowId xmlns:a16="http://schemas.microsoft.com/office/drawing/2014/main" xmlns="" val="10006"/>
+                  </a:ext>
+                </a:extLst>
+              </a:tr>
+              <a:tr h="505838">
+                <a:tc>
+                  <a:txBody>
+                    <a:bodyPr/>
+                    <a:lstStyle/>
+                    <a:p>
+                      <a:pPr marL="0" marR="0" lvl="0" indent="0" algn="ctr" defTabSz="914400" rtl="0" eaLnBrk="1" fontAlgn="auto" latinLnBrk="1" hangingPunct="1">
+                        <a:lnSpc>
+                          <a:spcPct val="100000"/>
+                        </a:lnSpc>
+                        <a:spcBef>
+                          <a:spcPts val="0"/>
+                        </a:spcBef>
+                        <a:spcAft>
+                          <a:spcPts val="0"/>
+                        </a:spcAft>
+                        <a:buClrTx/>
+                        <a:buSzTx/>
+                        <a:buFontTx/>
+                        <a:buNone/>
+                        <a:tabLst/>
+                        <a:defRPr/>
+                      </a:pPr>
+                      <a:endParaRPr lang="en-US" altLang="ko-KR" sz="1500" dirty="0" smtClean="0"/>
+                    </a:p>
+                  </a:txBody>
+                  <a:tcPr marL="91450" marR="91450" marT="45725" marB="45725" anchor="ctr">
+                    <a:lnL w="12700" cap="flat" cmpd="sng" algn="ctr">
+                      <a:solidFill>
+                        <a:schemeClr val="dk1"/>
+                      </a:solidFill>
+                      <a:prstDash val="solid"/>
+                      <a:round/>
+                      <a:headEnd type="none" w="sm" len="sm"/>
+                      <a:tailEnd type="none" w="sm" len="sm"/>
+                    </a:lnL>
+                    <a:lnR w="12700" cap="flat" cmpd="sng" algn="ctr">
+                      <a:solidFill>
+                        <a:schemeClr val="dk1"/>
+                      </a:solidFill>
+                      <a:prstDash val="solid"/>
+                      <a:round/>
+                      <a:headEnd type="none" w="sm" len="sm"/>
+                      <a:tailEnd type="none" w="sm" len="sm"/>
+                    </a:lnR>
+                    <a:lnT w="12700" cap="flat" cmpd="sng" algn="ctr">
+                      <a:solidFill>
+                        <a:schemeClr val="dk1"/>
+                      </a:solidFill>
+                      <a:prstDash val="solid"/>
+                      <a:round/>
+                      <a:headEnd type="none" w="sm" len="sm"/>
+                      <a:tailEnd type="none" w="sm" len="sm"/>
+                    </a:lnT>
+                    <a:lnB w="12700" cap="flat" cmpd="sng">
+                      <a:solidFill>
+                        <a:schemeClr val="dk1"/>
+                      </a:solidFill>
+                      <a:prstDash val="solid"/>
+                      <a:round/>
+                      <a:headEnd type="none" w="sm" len="sm"/>
+                      <a:tailEnd type="none" w="sm" len="sm"/>
+                    </a:lnB>
+                    <a:solidFill>
+                      <a:schemeClr val="lt1"/>
+                    </a:solidFill>
+                  </a:tcPr>
+                </a:tc>
+                <a:tc>
+                  <a:txBody>
+                    <a:bodyPr/>
+                    <a:lstStyle/>
+                    <a:p>
+                      <a:pPr marL="0" marR="0" lvl="0" indent="0" algn="l" defTabSz="914400" rtl="0" eaLnBrk="1" fontAlgn="auto" latinLnBrk="1" hangingPunct="1">
+                        <a:lnSpc>
+                          <a:spcPct val="100000"/>
+                        </a:lnSpc>
+                        <a:spcBef>
+                          <a:spcPts val="0"/>
+                        </a:spcBef>
+                        <a:spcAft>
+                          <a:spcPts val="0"/>
+                        </a:spcAft>
+                        <a:buClrTx/>
+                        <a:buSzTx/>
+                        <a:buFontTx/>
+                        <a:buNone/>
+                        <a:tabLst/>
+                        <a:defRPr/>
+                      </a:pPr>
+                      <a:endParaRPr lang="ko-KR" altLang="en-US" sz="1500" dirty="0" smtClean="0"/>
+                    </a:p>
+                  </a:txBody>
+                  <a:tcPr marL="91450" marR="91450" marT="45725" marB="45725">
+                    <a:lnL w="12700" cap="flat" cmpd="sng" algn="ctr">
+                      <a:solidFill>
+                        <a:schemeClr val="dk1"/>
+                      </a:solidFill>
+                      <a:prstDash val="solid"/>
+                      <a:round/>
+                      <a:headEnd type="none" w="sm" len="sm"/>
+                      <a:tailEnd type="none" w="sm" len="sm"/>
+                    </a:lnL>
+                    <a:lnR w="12700" cap="flat" cmpd="sng" algn="ctr">
+                      <a:solidFill>
+                        <a:schemeClr val="dk1"/>
+                      </a:solidFill>
+                      <a:prstDash val="solid"/>
+                      <a:round/>
+                      <a:headEnd type="none" w="sm" len="sm"/>
+                      <a:tailEnd type="none" w="sm" len="sm"/>
+                    </a:lnR>
+                    <a:lnT w="12700" cap="flat" cmpd="sng" algn="ctr">
+                      <a:solidFill>
+                        <a:schemeClr val="dk1"/>
+                      </a:solidFill>
+                      <a:prstDash val="solid"/>
+                      <a:round/>
+                      <a:headEnd type="none" w="sm" len="sm"/>
+                      <a:tailEnd type="none" w="sm" len="sm"/>
+                    </a:lnT>
+                    <a:lnB w="12700" cap="flat" cmpd="sng">
+                      <a:solidFill>
+                        <a:schemeClr val="dk1"/>
+                      </a:solidFill>
+                      <a:prstDash val="solid"/>
+                      <a:round/>
+                      <a:headEnd type="none" w="sm" len="sm"/>
+                      <a:tailEnd type="none" w="sm" len="sm"/>
+                    </a:lnB>
+                    <a:solidFill>
+                      <a:schemeClr val="lt1"/>
+                    </a:solidFill>
+                  </a:tcPr>
+                </a:tc>
+                <a:extLst>
+                  <a:ext uri="{0D108BD9-81ED-4DB2-BD59-A6C34878D82A}">
+                    <a16:rowId xmlns:a16="http://schemas.microsoft.com/office/drawing/2014/main" xmlns="" val="10007"/>
+                  </a:ext>
+                </a:extLst>
+              </a:tr>
+            </a:tbl>
+          </a:graphicData>
+        </a:graphic>
+      </p:graphicFrame>
+      <p:sp>
+        <p:nvSpPr>
+          <p:cNvPr id="168" name="Google Shape;168;g7c553259d1_0_81"/>
+          <p:cNvSpPr/>
+          <p:nvPr/>
+        </p:nvSpPr>
+        <p:spPr>
+          <a:xfrm>
+            <a:off x="157954" y="1271965"/>
+            <a:ext cx="8032200" cy="5349900"/>
+          </a:xfrm>
+          <a:prstGeom prst="rect">
+            <a:avLst/>
+          </a:prstGeom>
+          <a:noFill/>
+          <a:ln w="12700" cap="flat" cmpd="sng">
+            <a:solidFill>
+              <a:schemeClr val="dk1"/>
+            </a:solidFill>
+            <a:prstDash val="solid"/>
+            <a:miter lim="800000"/>
+            <a:headEnd type="none" w="sm" len="sm"/>
+            <a:tailEnd type="none" w="sm" len="sm"/>
+          </a:ln>
+        </p:spPr>
+        <p:txBody>
+          <a:bodyPr spcFirstLastPara="1" wrap="square" lIns="91425" tIns="45700" rIns="91425" bIns="45700" anchor="ctr" anchorCtr="0">
+            <a:noAutofit/>
+          </a:bodyPr>
+          <a:lstStyle/>
+          <a:p>
+            <a:pPr marL="0" marR="0" lvl="0" indent="0" algn="ctr" rtl="0">
+              <a:lnSpc>
+                <a:spcPct val="100000"/>
+              </a:lnSpc>
+              <a:spcBef>
+                <a:spcPts val="0"/>
+              </a:spcBef>
+              <a:spcAft>
+                <a:spcPts val="0"/>
+              </a:spcAft>
+              <a:buClr>
+                <a:srgbClr val="000000"/>
+              </a:buClr>
+              <a:buSzPts val="1500"/>
+              <a:buFont typeface="Arial"/>
+              <a:buNone/>
+            </a:pPr>
+            <a:endParaRPr sz="1500" b="0" i="0" u="none" strike="noStrike" cap="none">
+              <a:solidFill>
+                <a:schemeClr val="dk1"/>
+              </a:solidFill>
+              <a:latin typeface="Malgun Gothic"/>
+              <a:ea typeface="Malgun Gothic"/>
+              <a:cs typeface="Malgun Gothic"/>
+              <a:sym typeface="Malgun Gothic"/>
+            </a:endParaRPr>
+          </a:p>
+        </p:txBody>
+      </p:sp>
+    </p:spTree>
+    <p:extLst>
+      <p:ext uri="{BB962C8B-B14F-4D97-AF65-F5344CB8AC3E}">
+        <p14:creationId xmlns:p14="http://schemas.microsoft.com/office/powerpoint/2010/main" val="825647025"/>
+      </p:ext>
+    </p:extLst>
+  </p:cSld>
+  <p:clrMapOvr>
+    <a:masterClrMapping/>
+  </p:clrMapOvr>
+  <p:timing>
+    <p:tnLst>
+      <p:par>
+        <p:cTn id="1" dur="indefinite" restart="never" nodeType="tmRoot"/>
+      </p:par>
+    </p:tnLst>
+  </p:timing>
 </p:sld>
 </file>
 
@@ -3701,7 +5978,7 @@
   <a:extraClrSchemeLst/>
   <a:extLst>
     <a:ext uri="{05A4C25C-085E-4340-85A3-A5531E510DB2}">
-      <thm15:themeFamily xmlns:thm15="http://schemas.microsoft.com/office/thememl/2012/main" name="Office Theme" id="{62F939B6-93AF-4DB8-9C6B-D6C7DFDC589F}" vid="{4A3C46E8-61CC-4603-A589-7422A47A8E4A}"/>
+      <thm15:themeFamily xmlns:thm15="http://schemas.microsoft.com/office/thememl/2012/main" xmlns="" name="Office Theme" id="{62F939B6-93AF-4DB8-9C6B-D6C7DFDC589F}" vid="{4A3C46E8-61CC-4603-A589-7422A47A8E4A}"/>
     </a:ext>
   </a:extLst>
 </a:theme>
@@ -3962,7 +6239,7 @@
   <a:extraClrSchemeLst/>
   <a:extLst>
     <a:ext uri="{05A4C25C-085E-4340-85A3-A5531E510DB2}">
-      <thm15:themeFamily xmlns:thm15="http://schemas.microsoft.com/office/thememl/2012/main" name="Office Theme" id="{62F939B6-93AF-4DB8-9C6B-D6C7DFDC589F}" vid="{4A3C46E8-61CC-4603-A589-7422A47A8E4A}"/>
+      <thm15:themeFamily xmlns:thm15="http://schemas.microsoft.com/office/thememl/2012/main" xmlns="" name="Office Theme" id="{62F939B6-93AF-4DB8-9C6B-D6C7DFDC589F}" vid="{4A3C46E8-61CC-4603-A589-7422A47A8E4A}"/>
     </a:ext>
   </a:extLst>
 </a:theme>

</xml_diff>